<commit_message>
Supplementary Material added, main text improved
</commit_message>
<xml_diff>
--- a/figures/final/approxPR_schematic.pptx
+++ b/figures/final/approxPR_schematic.pptx
@@ -7,13 +7,13 @@
   <p:sldIdLst>
     <p:sldId id="256" r:id="rId2"/>
   </p:sldIdLst>
-  <p:sldSz cx="2743200" cy="1828800"/>
+  <p:sldSz cx="2743200" cy="1527175"/>
   <p:notesSz cx="6858000" cy="9144000"/>
   <p:defaultTextStyle>
     <a:defPPr>
       <a:defRPr lang="en-US"/>
     </a:defPPr>
-    <a:lvl1pPr marL="0" algn="l" defTabSz="130622" rtl="0" eaLnBrk="1" latinLnBrk="0" hangingPunct="1">
+    <a:lvl1pPr marL="0" algn="l" defTabSz="121981" rtl="0" eaLnBrk="1" latinLnBrk="0" hangingPunct="1">
       <a:defRPr sz="500" kern="1200">
         <a:solidFill>
           <a:schemeClr val="tx1"/>
@@ -23,7 +23,7 @@
         <a:cs typeface="+mn-cs"/>
       </a:defRPr>
     </a:lvl1pPr>
-    <a:lvl2pPr marL="130622" algn="l" defTabSz="130622" rtl="0" eaLnBrk="1" latinLnBrk="0" hangingPunct="1">
+    <a:lvl2pPr marL="121981" algn="l" defTabSz="121981" rtl="0" eaLnBrk="1" latinLnBrk="0" hangingPunct="1">
       <a:defRPr sz="500" kern="1200">
         <a:solidFill>
           <a:schemeClr val="tx1"/>
@@ -33,7 +33,7 @@
         <a:cs typeface="+mn-cs"/>
       </a:defRPr>
     </a:lvl2pPr>
-    <a:lvl3pPr marL="261244" algn="l" defTabSz="130622" rtl="0" eaLnBrk="1" latinLnBrk="0" hangingPunct="1">
+    <a:lvl3pPr marL="243962" algn="l" defTabSz="121981" rtl="0" eaLnBrk="1" latinLnBrk="0" hangingPunct="1">
       <a:defRPr sz="500" kern="1200">
         <a:solidFill>
           <a:schemeClr val="tx1"/>
@@ -43,7 +43,7 @@
         <a:cs typeface="+mn-cs"/>
       </a:defRPr>
     </a:lvl3pPr>
-    <a:lvl4pPr marL="391866" algn="l" defTabSz="130622" rtl="0" eaLnBrk="1" latinLnBrk="0" hangingPunct="1">
+    <a:lvl4pPr marL="365943" algn="l" defTabSz="121981" rtl="0" eaLnBrk="1" latinLnBrk="0" hangingPunct="1">
       <a:defRPr sz="500" kern="1200">
         <a:solidFill>
           <a:schemeClr val="tx1"/>
@@ -53,7 +53,7 @@
         <a:cs typeface="+mn-cs"/>
       </a:defRPr>
     </a:lvl4pPr>
-    <a:lvl5pPr marL="522488" algn="l" defTabSz="130622" rtl="0" eaLnBrk="1" latinLnBrk="0" hangingPunct="1">
+    <a:lvl5pPr marL="487924" algn="l" defTabSz="121981" rtl="0" eaLnBrk="1" latinLnBrk="0" hangingPunct="1">
       <a:defRPr sz="500" kern="1200">
         <a:solidFill>
           <a:schemeClr val="tx1"/>
@@ -63,7 +63,7 @@
         <a:cs typeface="+mn-cs"/>
       </a:defRPr>
     </a:lvl5pPr>
-    <a:lvl6pPr marL="653110" algn="l" defTabSz="130622" rtl="0" eaLnBrk="1" latinLnBrk="0" hangingPunct="1">
+    <a:lvl6pPr marL="609905" algn="l" defTabSz="121981" rtl="0" eaLnBrk="1" latinLnBrk="0" hangingPunct="1">
       <a:defRPr sz="500" kern="1200">
         <a:solidFill>
           <a:schemeClr val="tx1"/>
@@ -73,7 +73,7 @@
         <a:cs typeface="+mn-cs"/>
       </a:defRPr>
     </a:lvl6pPr>
-    <a:lvl7pPr marL="783732" algn="l" defTabSz="130622" rtl="0" eaLnBrk="1" latinLnBrk="0" hangingPunct="1">
+    <a:lvl7pPr marL="731886" algn="l" defTabSz="121981" rtl="0" eaLnBrk="1" latinLnBrk="0" hangingPunct="1">
       <a:defRPr sz="500" kern="1200">
         <a:solidFill>
           <a:schemeClr val="tx1"/>
@@ -83,7 +83,7 @@
         <a:cs typeface="+mn-cs"/>
       </a:defRPr>
     </a:lvl7pPr>
-    <a:lvl8pPr marL="914354" algn="l" defTabSz="130622" rtl="0" eaLnBrk="1" latinLnBrk="0" hangingPunct="1">
+    <a:lvl8pPr marL="853867" algn="l" defTabSz="121981" rtl="0" eaLnBrk="1" latinLnBrk="0" hangingPunct="1">
       <a:defRPr sz="500" kern="1200">
         <a:solidFill>
           <a:schemeClr val="tx1"/>
@@ -93,7 +93,7 @@
         <a:cs typeface="+mn-cs"/>
       </a:defRPr>
     </a:lvl8pPr>
-    <a:lvl9pPr marL="1044976" algn="l" defTabSz="130622" rtl="0" eaLnBrk="1" latinLnBrk="0" hangingPunct="1">
+    <a:lvl9pPr marL="975848" algn="l" defTabSz="121981" rtl="0" eaLnBrk="1" latinLnBrk="0" hangingPunct="1">
       <a:defRPr sz="500" kern="1200">
         <a:solidFill>
           <a:schemeClr val="tx1"/>
@@ -136,8 +136,8 @@
         </p:nvSpPr>
         <p:spPr>
           <a:xfrm>
-            <a:off x="205740" y="568113"/>
-            <a:ext cx="2331720" cy="392007"/>
+            <a:off x="205740" y="474414"/>
+            <a:ext cx="2331720" cy="327353"/>
           </a:xfrm>
         </p:spPr>
         <p:txBody>
@@ -164,8 +164,8 @@
         </p:nvSpPr>
         <p:spPr>
           <a:xfrm>
-            <a:off x="411480" y="1036320"/>
-            <a:ext cx="1920240" cy="467360"/>
+            <a:off x="411480" y="865399"/>
+            <a:ext cx="1920240" cy="390278"/>
           </a:xfrm>
         </p:spPr>
         <p:txBody>
@@ -181,7 +181,7 @@
                 </a:solidFill>
               </a:defRPr>
             </a:lvl1pPr>
-            <a:lvl2pPr marL="130622" indent="0" algn="ctr">
+            <a:lvl2pPr marL="121981" indent="0" algn="ctr">
               <a:buNone/>
               <a:defRPr>
                 <a:solidFill>
@@ -191,7 +191,7 @@
                 </a:solidFill>
               </a:defRPr>
             </a:lvl2pPr>
-            <a:lvl3pPr marL="261244" indent="0" algn="ctr">
+            <a:lvl3pPr marL="243962" indent="0" algn="ctr">
               <a:buNone/>
               <a:defRPr>
                 <a:solidFill>
@@ -201,7 +201,7 @@
                 </a:solidFill>
               </a:defRPr>
             </a:lvl3pPr>
-            <a:lvl4pPr marL="391866" indent="0" algn="ctr">
+            <a:lvl4pPr marL="365943" indent="0" algn="ctr">
               <a:buNone/>
               <a:defRPr>
                 <a:solidFill>
@@ -211,7 +211,7 @@
                 </a:solidFill>
               </a:defRPr>
             </a:lvl4pPr>
-            <a:lvl5pPr marL="522488" indent="0" algn="ctr">
+            <a:lvl5pPr marL="487924" indent="0" algn="ctr">
               <a:buNone/>
               <a:defRPr>
                 <a:solidFill>
@@ -221,7 +221,7 @@
                 </a:solidFill>
               </a:defRPr>
             </a:lvl5pPr>
-            <a:lvl6pPr marL="653110" indent="0" algn="ctr">
+            <a:lvl6pPr marL="609905" indent="0" algn="ctr">
               <a:buNone/>
               <a:defRPr>
                 <a:solidFill>
@@ -231,7 +231,7 @@
                 </a:solidFill>
               </a:defRPr>
             </a:lvl6pPr>
-            <a:lvl7pPr marL="783732" indent="0" algn="ctr">
+            <a:lvl7pPr marL="731886" indent="0" algn="ctr">
               <a:buNone/>
               <a:defRPr>
                 <a:solidFill>
@@ -241,7 +241,7 @@
                 </a:solidFill>
               </a:defRPr>
             </a:lvl7pPr>
-            <a:lvl8pPr marL="914354" indent="0" algn="ctr">
+            <a:lvl8pPr marL="853867" indent="0" algn="ctr">
               <a:buNone/>
               <a:defRPr>
                 <a:solidFill>
@@ -251,7 +251,7 @@
                 </a:solidFill>
               </a:defRPr>
             </a:lvl8pPr>
-            <a:lvl9pPr marL="1044976" indent="0" algn="ctr">
+            <a:lvl9pPr marL="975848" indent="0" algn="ctr">
               <a:buNone/>
               <a:defRPr>
                 <a:solidFill>
@@ -286,9 +286,9 @@
           <a:bodyPr/>
           <a:lstStyle/>
           <a:p>
-            <a:fld id="{DBD1CA87-5CDA-1B4E-AFFD-49F944A7DA10}" type="datetimeFigureOut">
-              <a:rPr lang="en-US" smtClean="0"/>
-              <a:t>9/8/16</a:t>
+            <a:fld id="{74EFC610-E518-4248-BDA6-A4C8BE5C5477}" type="datetimeFigureOut">
+              <a:rPr lang="en-US" smtClean="0"/>
+              <a:t>9/12/16</a:t>
             </a:fld>
             <a:endParaRPr lang="en-US"/>
           </a:p>
@@ -328,7 +328,7 @@
           <a:bodyPr/>
           <a:lstStyle/>
           <a:p>
-            <a:fld id="{F626A08C-7AA7-284C-A4EE-A423268B7263}" type="slidenum">
+            <a:fld id="{E0112F47-9B93-9343-892D-7B766A8240CF}" type="slidenum">
               <a:rPr lang="en-US" smtClean="0"/>
               <a:t>‹#›</a:t>
             </a:fld>
@@ -339,7 +339,7 @@
     </p:spTree>
     <p:extLst>
       <p:ext uri="{BB962C8B-B14F-4D97-AF65-F5344CB8AC3E}">
-        <p14:creationId xmlns:p14="http://schemas.microsoft.com/office/powerpoint/2010/main" val="2553003294"/>
+        <p14:creationId xmlns:p14="http://schemas.microsoft.com/office/powerpoint/2010/main" val="141197772"/>
       </p:ext>
     </p:extLst>
   </p:cSld>
@@ -456,9 +456,9 @@
           <a:bodyPr/>
           <a:lstStyle/>
           <a:p>
-            <a:fld id="{DBD1CA87-5CDA-1B4E-AFFD-49F944A7DA10}" type="datetimeFigureOut">
-              <a:rPr lang="en-US" smtClean="0"/>
-              <a:t>9/8/16</a:t>
+            <a:fld id="{74EFC610-E518-4248-BDA6-A4C8BE5C5477}" type="datetimeFigureOut">
+              <a:rPr lang="en-US" smtClean="0"/>
+              <a:t>9/12/16</a:t>
             </a:fld>
             <a:endParaRPr lang="en-US"/>
           </a:p>
@@ -498,7 +498,7 @@
           <a:bodyPr/>
           <a:lstStyle/>
           <a:p>
-            <a:fld id="{F626A08C-7AA7-284C-A4EE-A423268B7263}" type="slidenum">
+            <a:fld id="{E0112F47-9B93-9343-892D-7B766A8240CF}" type="slidenum">
               <a:rPr lang="en-US" smtClean="0"/>
               <a:t>‹#›</a:t>
             </a:fld>
@@ -509,7 +509,7 @@
     </p:spTree>
     <p:extLst>
       <p:ext uri="{BB962C8B-B14F-4D97-AF65-F5344CB8AC3E}">
-        <p14:creationId xmlns:p14="http://schemas.microsoft.com/office/powerpoint/2010/main" val="647603549"/>
+        <p14:creationId xmlns:p14="http://schemas.microsoft.com/office/powerpoint/2010/main" val="2799243837"/>
       </p:ext>
     </p:extLst>
   </p:cSld>
@@ -548,8 +548,8 @@
         </p:nvSpPr>
         <p:spPr>
           <a:xfrm>
-            <a:off x="596742" y="19473"/>
-            <a:ext cx="185261" cy="416137"/>
+            <a:off x="596742" y="13787"/>
+            <a:ext cx="185261" cy="289880"/>
           </a:xfrm>
         </p:spPr>
         <p:txBody>
@@ -576,8 +576,8 @@
         </p:nvSpPr>
         <p:spPr>
           <a:xfrm>
-            <a:off x="40958" y="19473"/>
-            <a:ext cx="510064" cy="416137"/>
+            <a:off x="40958" y="13787"/>
+            <a:ext cx="510064" cy="289880"/>
           </a:xfrm>
         </p:spPr>
         <p:txBody>
@@ -636,9 +636,9 @@
           <a:bodyPr/>
           <a:lstStyle/>
           <a:p>
-            <a:fld id="{DBD1CA87-5CDA-1B4E-AFFD-49F944A7DA10}" type="datetimeFigureOut">
-              <a:rPr lang="en-US" smtClean="0"/>
-              <a:t>9/8/16</a:t>
+            <a:fld id="{74EFC610-E518-4248-BDA6-A4C8BE5C5477}" type="datetimeFigureOut">
+              <a:rPr lang="en-US" smtClean="0"/>
+              <a:t>9/12/16</a:t>
             </a:fld>
             <a:endParaRPr lang="en-US"/>
           </a:p>
@@ -678,7 +678,7 @@
           <a:bodyPr/>
           <a:lstStyle/>
           <a:p>
-            <a:fld id="{F626A08C-7AA7-284C-A4EE-A423268B7263}" type="slidenum">
+            <a:fld id="{E0112F47-9B93-9343-892D-7B766A8240CF}" type="slidenum">
               <a:rPr lang="en-US" smtClean="0"/>
               <a:t>‹#›</a:t>
             </a:fld>
@@ -689,7 +689,7 @@
     </p:spTree>
     <p:extLst>
       <p:ext uri="{BB962C8B-B14F-4D97-AF65-F5344CB8AC3E}">
-        <p14:creationId xmlns:p14="http://schemas.microsoft.com/office/powerpoint/2010/main" val="1078014209"/>
+        <p14:creationId xmlns:p14="http://schemas.microsoft.com/office/powerpoint/2010/main" val="3274993561"/>
       </p:ext>
     </p:extLst>
   </p:cSld>
@@ -806,9 +806,9 @@
           <a:bodyPr/>
           <a:lstStyle/>
           <a:p>
-            <a:fld id="{DBD1CA87-5CDA-1B4E-AFFD-49F944A7DA10}" type="datetimeFigureOut">
-              <a:rPr lang="en-US" smtClean="0"/>
-              <a:t>9/8/16</a:t>
+            <a:fld id="{74EFC610-E518-4248-BDA6-A4C8BE5C5477}" type="datetimeFigureOut">
+              <a:rPr lang="en-US" smtClean="0"/>
+              <a:t>9/12/16</a:t>
             </a:fld>
             <a:endParaRPr lang="en-US"/>
           </a:p>
@@ -848,7 +848,7 @@
           <a:bodyPr/>
           <a:lstStyle/>
           <a:p>
-            <a:fld id="{F626A08C-7AA7-284C-A4EE-A423268B7263}" type="slidenum">
+            <a:fld id="{E0112F47-9B93-9343-892D-7B766A8240CF}" type="slidenum">
               <a:rPr lang="en-US" smtClean="0"/>
               <a:t>‹#›</a:t>
             </a:fld>
@@ -859,7 +859,7 @@
     </p:spTree>
     <p:extLst>
       <p:ext uri="{BB962C8B-B14F-4D97-AF65-F5344CB8AC3E}">
-        <p14:creationId xmlns:p14="http://schemas.microsoft.com/office/powerpoint/2010/main" val="615865614"/>
+        <p14:creationId xmlns:p14="http://schemas.microsoft.com/office/powerpoint/2010/main" val="901490481"/>
       </p:ext>
     </p:extLst>
   </p:cSld>
@@ -898,8 +898,8 @@
         </p:nvSpPr>
         <p:spPr>
           <a:xfrm>
-            <a:off x="216694" y="1175173"/>
-            <a:ext cx="2331720" cy="363220"/>
+            <a:off x="216694" y="981351"/>
+            <a:ext cx="2331720" cy="303314"/>
           </a:xfrm>
         </p:spPr>
         <p:txBody>
@@ -930,8 +930,8 @@
         </p:nvSpPr>
         <p:spPr>
           <a:xfrm>
-            <a:off x="216694" y="775124"/>
-            <a:ext cx="2331720" cy="400050"/>
+            <a:off x="216694" y="647282"/>
+            <a:ext cx="2331720" cy="334069"/>
           </a:xfrm>
         </p:spPr>
         <p:txBody>
@@ -939,7 +939,7 @@
           <a:lstStyle>
             <a:lvl1pPr marL="0" indent="0">
               <a:buNone/>
-              <a:defRPr sz="600">
+              <a:defRPr sz="500">
                 <a:solidFill>
                   <a:schemeClr val="tx1">
                     <a:tint val="75000"/>
@@ -947,7 +947,7 @@
                 </a:solidFill>
               </a:defRPr>
             </a:lvl1pPr>
-            <a:lvl2pPr marL="130622" indent="0">
+            <a:lvl2pPr marL="121981" indent="0">
               <a:buNone/>
               <a:defRPr sz="500">
                 <a:solidFill>
@@ -957,9 +957,9 @@
                 </a:solidFill>
               </a:defRPr>
             </a:lvl2pPr>
-            <a:lvl3pPr marL="261244" indent="0">
-              <a:buNone/>
-              <a:defRPr sz="500">
+            <a:lvl3pPr marL="243962" indent="0">
+              <a:buNone/>
+              <a:defRPr sz="400">
                 <a:solidFill>
                   <a:schemeClr val="tx1">
                     <a:tint val="75000"/>
@@ -967,7 +967,7 @@
                 </a:solidFill>
               </a:defRPr>
             </a:lvl3pPr>
-            <a:lvl4pPr marL="391866" indent="0">
+            <a:lvl4pPr marL="365943" indent="0">
               <a:buNone/>
               <a:defRPr sz="400">
                 <a:solidFill>
@@ -977,7 +977,7 @@
                 </a:solidFill>
               </a:defRPr>
             </a:lvl4pPr>
-            <a:lvl5pPr marL="522488" indent="0">
+            <a:lvl5pPr marL="487924" indent="0">
               <a:buNone/>
               <a:defRPr sz="400">
                 <a:solidFill>
@@ -987,7 +987,7 @@
                 </a:solidFill>
               </a:defRPr>
             </a:lvl5pPr>
-            <a:lvl6pPr marL="653110" indent="0">
+            <a:lvl6pPr marL="609905" indent="0">
               <a:buNone/>
               <a:defRPr sz="400">
                 <a:solidFill>
@@ -997,7 +997,7 @@
                 </a:solidFill>
               </a:defRPr>
             </a:lvl6pPr>
-            <a:lvl7pPr marL="783732" indent="0">
+            <a:lvl7pPr marL="731886" indent="0">
               <a:buNone/>
               <a:defRPr sz="400">
                 <a:solidFill>
@@ -1007,7 +1007,7 @@
                 </a:solidFill>
               </a:defRPr>
             </a:lvl7pPr>
-            <a:lvl8pPr marL="914354" indent="0">
+            <a:lvl8pPr marL="853867" indent="0">
               <a:buNone/>
               <a:defRPr sz="400">
                 <a:solidFill>
@@ -1017,7 +1017,7 @@
                 </a:solidFill>
               </a:defRPr>
             </a:lvl8pPr>
-            <a:lvl9pPr marL="1044976" indent="0">
+            <a:lvl9pPr marL="975848" indent="0">
               <a:buNone/>
               <a:defRPr sz="400">
                 <a:solidFill>
@@ -1052,9 +1052,9 @@
           <a:bodyPr/>
           <a:lstStyle/>
           <a:p>
-            <a:fld id="{DBD1CA87-5CDA-1B4E-AFFD-49F944A7DA10}" type="datetimeFigureOut">
-              <a:rPr lang="en-US" smtClean="0"/>
-              <a:t>9/8/16</a:t>
+            <a:fld id="{74EFC610-E518-4248-BDA6-A4C8BE5C5477}" type="datetimeFigureOut">
+              <a:rPr lang="en-US" smtClean="0"/>
+              <a:t>9/12/16</a:t>
             </a:fld>
             <a:endParaRPr lang="en-US"/>
           </a:p>
@@ -1094,7 +1094,7 @@
           <a:bodyPr/>
           <a:lstStyle/>
           <a:p>
-            <a:fld id="{F626A08C-7AA7-284C-A4EE-A423268B7263}" type="slidenum">
+            <a:fld id="{E0112F47-9B93-9343-892D-7B766A8240CF}" type="slidenum">
               <a:rPr lang="en-US" smtClean="0"/>
               <a:t>‹#›</a:t>
             </a:fld>
@@ -1105,7 +1105,7 @@
     </p:spTree>
     <p:extLst>
       <p:ext uri="{BB962C8B-B14F-4D97-AF65-F5344CB8AC3E}">
-        <p14:creationId xmlns:p14="http://schemas.microsoft.com/office/powerpoint/2010/main" val="4052070084"/>
+        <p14:creationId xmlns:p14="http://schemas.microsoft.com/office/powerpoint/2010/main" val="1184127732"/>
       </p:ext>
     </p:extLst>
   </p:cSld>
@@ -1167,370 +1167,8 @@
         </p:nvSpPr>
         <p:spPr>
           <a:xfrm>
-            <a:off x="40957" y="113877"/>
-            <a:ext cx="347663" cy="321733"/>
-          </a:xfrm>
-        </p:spPr>
-        <p:txBody>
-          <a:bodyPr/>
-          <a:lstStyle>
-            <a:lvl1pPr>
-              <a:defRPr sz="800"/>
-            </a:lvl1pPr>
-            <a:lvl2pPr>
-              <a:defRPr sz="700"/>
-            </a:lvl2pPr>
-            <a:lvl3pPr>
-              <a:defRPr sz="600"/>
-            </a:lvl3pPr>
-            <a:lvl4pPr>
-              <a:defRPr sz="500"/>
-            </a:lvl4pPr>
-            <a:lvl5pPr>
-              <a:defRPr sz="500"/>
-            </a:lvl5pPr>
-            <a:lvl6pPr>
-              <a:defRPr sz="500"/>
-            </a:lvl6pPr>
-            <a:lvl7pPr>
-              <a:defRPr sz="500"/>
-            </a:lvl7pPr>
-            <a:lvl8pPr>
-              <a:defRPr sz="500"/>
-            </a:lvl8pPr>
-            <a:lvl9pPr>
-              <a:defRPr sz="500"/>
-            </a:lvl9pPr>
-          </a:lstStyle>
-          <a:p>
-            <a:pPr lvl="0"/>
-            <a:r>
-              <a:rPr lang="en-US" smtClean="0"/>
-              <a:t>Click to edit Master text styles</a:t>
-            </a:r>
-          </a:p>
-          <a:p>
-            <a:pPr lvl="1"/>
-            <a:r>
-              <a:rPr lang="en-US" smtClean="0"/>
-              <a:t>Second level</a:t>
-            </a:r>
-          </a:p>
-          <a:p>
-            <a:pPr lvl="2"/>
-            <a:r>
-              <a:rPr lang="en-US" smtClean="0"/>
-              <a:t>Third level</a:t>
-            </a:r>
-          </a:p>
-          <a:p>
-            <a:pPr lvl="3"/>
-            <a:r>
-              <a:rPr lang="en-US" smtClean="0"/>
-              <a:t>Fourth level</a:t>
-            </a:r>
-          </a:p>
-          <a:p>
-            <a:pPr lvl="4"/>
-            <a:r>
-              <a:rPr lang="en-US" smtClean="0"/>
-              <a:t>Fifth level</a:t>
-            </a:r>
-            <a:endParaRPr lang="en-US"/>
-          </a:p>
-        </p:txBody>
-      </p:sp>
-      <p:sp>
-        <p:nvSpPr>
-          <p:cNvPr id="4" name="Content Placeholder 3"/>
-          <p:cNvSpPr>
-            <a:spLocks noGrp="1"/>
-          </p:cNvSpPr>
-          <p:nvPr>
-            <p:ph sz="half" idx="2"/>
-          </p:nvPr>
-        </p:nvSpPr>
-        <p:spPr>
-          <a:xfrm>
-            <a:off x="434340" y="113877"/>
-            <a:ext cx="347663" cy="321733"/>
-          </a:xfrm>
-        </p:spPr>
-        <p:txBody>
-          <a:bodyPr/>
-          <a:lstStyle>
-            <a:lvl1pPr>
-              <a:defRPr sz="800"/>
-            </a:lvl1pPr>
-            <a:lvl2pPr>
-              <a:defRPr sz="700"/>
-            </a:lvl2pPr>
-            <a:lvl3pPr>
-              <a:defRPr sz="600"/>
-            </a:lvl3pPr>
-            <a:lvl4pPr>
-              <a:defRPr sz="500"/>
-            </a:lvl4pPr>
-            <a:lvl5pPr>
-              <a:defRPr sz="500"/>
-            </a:lvl5pPr>
-            <a:lvl6pPr>
-              <a:defRPr sz="500"/>
-            </a:lvl6pPr>
-            <a:lvl7pPr>
-              <a:defRPr sz="500"/>
-            </a:lvl7pPr>
-            <a:lvl8pPr>
-              <a:defRPr sz="500"/>
-            </a:lvl8pPr>
-            <a:lvl9pPr>
-              <a:defRPr sz="500"/>
-            </a:lvl9pPr>
-          </a:lstStyle>
-          <a:p>
-            <a:pPr lvl="0"/>
-            <a:r>
-              <a:rPr lang="en-US" smtClean="0"/>
-              <a:t>Click to edit Master text styles</a:t>
-            </a:r>
-          </a:p>
-          <a:p>
-            <a:pPr lvl="1"/>
-            <a:r>
-              <a:rPr lang="en-US" smtClean="0"/>
-              <a:t>Second level</a:t>
-            </a:r>
-          </a:p>
-          <a:p>
-            <a:pPr lvl="2"/>
-            <a:r>
-              <a:rPr lang="en-US" smtClean="0"/>
-              <a:t>Third level</a:t>
-            </a:r>
-          </a:p>
-          <a:p>
-            <a:pPr lvl="3"/>
-            <a:r>
-              <a:rPr lang="en-US" smtClean="0"/>
-              <a:t>Fourth level</a:t>
-            </a:r>
-          </a:p>
-          <a:p>
-            <a:pPr lvl="4"/>
-            <a:r>
-              <a:rPr lang="en-US" smtClean="0"/>
-              <a:t>Fifth level</a:t>
-            </a:r>
-            <a:endParaRPr lang="en-US"/>
-          </a:p>
-        </p:txBody>
-      </p:sp>
-      <p:sp>
-        <p:nvSpPr>
-          <p:cNvPr id="5" name="Date Placeholder 4"/>
-          <p:cNvSpPr>
-            <a:spLocks noGrp="1"/>
-          </p:cNvSpPr>
-          <p:nvPr>
-            <p:ph type="dt" sz="half" idx="10"/>
-          </p:nvPr>
-        </p:nvSpPr>
-        <p:spPr/>
-        <p:txBody>
-          <a:bodyPr/>
-          <a:lstStyle/>
-          <a:p>
-            <a:fld id="{DBD1CA87-5CDA-1B4E-AFFD-49F944A7DA10}" type="datetimeFigureOut">
-              <a:rPr lang="en-US" smtClean="0"/>
-              <a:t>9/8/16</a:t>
-            </a:fld>
-            <a:endParaRPr lang="en-US"/>
-          </a:p>
-        </p:txBody>
-      </p:sp>
-      <p:sp>
-        <p:nvSpPr>
-          <p:cNvPr id="6" name="Footer Placeholder 5"/>
-          <p:cNvSpPr>
-            <a:spLocks noGrp="1"/>
-          </p:cNvSpPr>
-          <p:nvPr>
-            <p:ph type="ftr" sz="quarter" idx="11"/>
-          </p:nvPr>
-        </p:nvSpPr>
-        <p:spPr/>
-        <p:txBody>
-          <a:bodyPr/>
-          <a:lstStyle/>
-          <a:p>
-            <a:endParaRPr lang="en-US"/>
-          </a:p>
-        </p:txBody>
-      </p:sp>
-      <p:sp>
-        <p:nvSpPr>
-          <p:cNvPr id="7" name="Slide Number Placeholder 6"/>
-          <p:cNvSpPr>
-            <a:spLocks noGrp="1"/>
-          </p:cNvSpPr>
-          <p:nvPr>
-            <p:ph type="sldNum" sz="quarter" idx="12"/>
-          </p:nvPr>
-        </p:nvSpPr>
-        <p:spPr/>
-        <p:txBody>
-          <a:bodyPr/>
-          <a:lstStyle/>
-          <a:p>
-            <a:fld id="{F626A08C-7AA7-284C-A4EE-A423268B7263}" type="slidenum">
-              <a:rPr lang="en-US" smtClean="0"/>
-              <a:t>‹#›</a:t>
-            </a:fld>
-            <a:endParaRPr lang="en-US"/>
-          </a:p>
-        </p:txBody>
-      </p:sp>
-    </p:spTree>
-    <p:extLst>
-      <p:ext uri="{BB962C8B-B14F-4D97-AF65-F5344CB8AC3E}">
-        <p14:creationId xmlns:p14="http://schemas.microsoft.com/office/powerpoint/2010/main" val="1077134973"/>
-      </p:ext>
-    </p:extLst>
-  </p:cSld>
-  <p:clrMapOvr>
-    <a:masterClrMapping/>
-  </p:clrMapOvr>
-</p:sldLayout>
-</file>
-
-<file path=ppt/slideLayouts/slideLayout5.xml><?xml version="1.0" encoding="utf-8"?>
-<p:sldLayout xmlns:a="http://schemas.openxmlformats.org/drawingml/2006/main" xmlns:r="http://schemas.openxmlformats.org/officeDocument/2006/relationships" xmlns:p="http://schemas.openxmlformats.org/presentationml/2006/main" type="twoTxTwoObj" preserve="1">
-  <p:cSld name="Comparison">
-    <p:spTree>
-      <p:nvGrpSpPr>
-        <p:cNvPr id="1" name=""/>
-        <p:cNvGrpSpPr/>
-        <p:nvPr/>
-      </p:nvGrpSpPr>
-      <p:grpSpPr>
-        <a:xfrm>
-          <a:off x="0" y="0"/>
-          <a:ext cx="0" cy="0"/>
-          <a:chOff x="0" y="0"/>
-          <a:chExt cx="0" cy="0"/>
-        </a:xfrm>
-      </p:grpSpPr>
-      <p:sp>
-        <p:nvSpPr>
-          <p:cNvPr id="2" name="Title 1"/>
-          <p:cNvSpPr>
-            <a:spLocks noGrp="1"/>
-          </p:cNvSpPr>
-          <p:nvPr>
-            <p:ph type="title"/>
-          </p:nvPr>
-        </p:nvSpPr>
-        <p:spPr>
-          <a:xfrm>
-            <a:off x="137160" y="73237"/>
-            <a:ext cx="2468880" cy="304800"/>
-          </a:xfrm>
-        </p:spPr>
-        <p:txBody>
-          <a:bodyPr/>
-          <a:lstStyle>
-            <a:lvl1pPr>
-              <a:defRPr/>
-            </a:lvl1pPr>
-          </a:lstStyle>
-          <a:p>
-            <a:r>
-              <a:rPr lang="en-US" smtClean="0"/>
-              <a:t>Click to edit Master title style</a:t>
-            </a:r>
-            <a:endParaRPr lang="en-US"/>
-          </a:p>
-        </p:txBody>
-      </p:sp>
-      <p:sp>
-        <p:nvSpPr>
-          <p:cNvPr id="3" name="Text Placeholder 2"/>
-          <p:cNvSpPr>
-            <a:spLocks noGrp="1"/>
-          </p:cNvSpPr>
-          <p:nvPr>
-            <p:ph type="body" idx="1"/>
-          </p:nvPr>
-        </p:nvSpPr>
-        <p:spPr>
-          <a:xfrm>
-            <a:off x="137160" y="409364"/>
-            <a:ext cx="1212056" cy="170603"/>
-          </a:xfrm>
-        </p:spPr>
-        <p:txBody>
-          <a:bodyPr anchor="b"/>
-          <a:lstStyle>
-            <a:lvl1pPr marL="0" indent="0">
-              <a:buNone/>
-              <a:defRPr sz="700" b="1"/>
-            </a:lvl1pPr>
-            <a:lvl2pPr marL="130622" indent="0">
-              <a:buNone/>
-              <a:defRPr sz="600" b="1"/>
-            </a:lvl2pPr>
-            <a:lvl3pPr marL="261244" indent="0">
-              <a:buNone/>
-              <a:defRPr sz="500" b="1"/>
-            </a:lvl3pPr>
-            <a:lvl4pPr marL="391866" indent="0">
-              <a:buNone/>
-              <a:defRPr sz="500" b="1"/>
-            </a:lvl4pPr>
-            <a:lvl5pPr marL="522488" indent="0">
-              <a:buNone/>
-              <a:defRPr sz="500" b="1"/>
-            </a:lvl5pPr>
-            <a:lvl6pPr marL="653110" indent="0">
-              <a:buNone/>
-              <a:defRPr sz="500" b="1"/>
-            </a:lvl6pPr>
-            <a:lvl7pPr marL="783732" indent="0">
-              <a:buNone/>
-              <a:defRPr sz="500" b="1"/>
-            </a:lvl7pPr>
-            <a:lvl8pPr marL="914354" indent="0">
-              <a:buNone/>
-              <a:defRPr sz="500" b="1"/>
-            </a:lvl8pPr>
-            <a:lvl9pPr marL="1044976" indent="0">
-              <a:buNone/>
-              <a:defRPr sz="500" b="1"/>
-            </a:lvl9pPr>
-          </a:lstStyle>
-          <a:p>
-            <a:pPr lvl="0"/>
-            <a:r>
-              <a:rPr lang="en-US" smtClean="0"/>
-              <a:t>Click to edit Master text styles</a:t>
-            </a:r>
-          </a:p>
-        </p:txBody>
-      </p:sp>
-      <p:sp>
-        <p:nvSpPr>
-          <p:cNvPr id="4" name="Content Placeholder 3"/>
-          <p:cNvSpPr>
-            <a:spLocks noGrp="1"/>
-          </p:cNvSpPr>
-          <p:nvPr>
-            <p:ph sz="half" idx="2"/>
-          </p:nvPr>
-        </p:nvSpPr>
-        <p:spPr>
-          <a:xfrm>
-            <a:off x="137160" y="579967"/>
-            <a:ext cx="1212056" cy="1053677"/>
+            <a:off x="40957" y="79187"/>
+            <a:ext cx="347663" cy="224481"/>
           </a:xfrm>
         </p:spPr>
         <p:txBody>
@@ -1604,83 +1242,18 @@
       </p:sp>
       <p:sp>
         <p:nvSpPr>
-          <p:cNvPr id="5" name="Text Placeholder 4"/>
-          <p:cNvSpPr>
-            <a:spLocks noGrp="1"/>
-          </p:cNvSpPr>
-          <p:nvPr>
-            <p:ph type="body" sz="quarter" idx="3"/>
+          <p:cNvPr id="4" name="Content Placeholder 3"/>
+          <p:cNvSpPr>
+            <a:spLocks noGrp="1"/>
+          </p:cNvSpPr>
+          <p:nvPr>
+            <p:ph sz="half" idx="2"/>
           </p:nvPr>
         </p:nvSpPr>
         <p:spPr>
           <a:xfrm>
-            <a:off x="1393507" y="409364"/>
-            <a:ext cx="1212533" cy="170603"/>
-          </a:xfrm>
-        </p:spPr>
-        <p:txBody>
-          <a:bodyPr anchor="b"/>
-          <a:lstStyle>
-            <a:lvl1pPr marL="0" indent="0">
-              <a:buNone/>
-              <a:defRPr sz="700" b="1"/>
-            </a:lvl1pPr>
-            <a:lvl2pPr marL="130622" indent="0">
-              <a:buNone/>
-              <a:defRPr sz="600" b="1"/>
-            </a:lvl2pPr>
-            <a:lvl3pPr marL="261244" indent="0">
-              <a:buNone/>
-              <a:defRPr sz="500" b="1"/>
-            </a:lvl3pPr>
-            <a:lvl4pPr marL="391866" indent="0">
-              <a:buNone/>
-              <a:defRPr sz="500" b="1"/>
-            </a:lvl4pPr>
-            <a:lvl5pPr marL="522488" indent="0">
-              <a:buNone/>
-              <a:defRPr sz="500" b="1"/>
-            </a:lvl5pPr>
-            <a:lvl6pPr marL="653110" indent="0">
-              <a:buNone/>
-              <a:defRPr sz="500" b="1"/>
-            </a:lvl6pPr>
-            <a:lvl7pPr marL="783732" indent="0">
-              <a:buNone/>
-              <a:defRPr sz="500" b="1"/>
-            </a:lvl7pPr>
-            <a:lvl8pPr marL="914354" indent="0">
-              <a:buNone/>
-              <a:defRPr sz="500" b="1"/>
-            </a:lvl8pPr>
-            <a:lvl9pPr marL="1044976" indent="0">
-              <a:buNone/>
-              <a:defRPr sz="500" b="1"/>
-            </a:lvl9pPr>
-          </a:lstStyle>
-          <a:p>
-            <a:pPr lvl="0"/>
-            <a:r>
-              <a:rPr lang="en-US" smtClean="0"/>
-              <a:t>Click to edit Master text styles</a:t>
-            </a:r>
-          </a:p>
-        </p:txBody>
-      </p:sp>
-      <p:sp>
-        <p:nvSpPr>
-          <p:cNvPr id="6" name="Content Placeholder 5"/>
-          <p:cNvSpPr>
-            <a:spLocks noGrp="1"/>
-          </p:cNvSpPr>
-          <p:nvPr>
-            <p:ph sz="quarter" idx="4"/>
-          </p:nvPr>
-        </p:nvSpPr>
-        <p:spPr>
-          <a:xfrm>
-            <a:off x="1393507" y="579967"/>
-            <a:ext cx="1212533" cy="1053677"/>
+            <a:off x="434340" y="79187"/>
+            <a:ext cx="347663" cy="224481"/>
           </a:xfrm>
         </p:spPr>
         <p:txBody>
@@ -1754,7 +1327,7 @@
       </p:sp>
       <p:sp>
         <p:nvSpPr>
-          <p:cNvPr id="7" name="Date Placeholder 6"/>
+          <p:cNvPr id="5" name="Date Placeholder 4"/>
           <p:cNvSpPr>
             <a:spLocks noGrp="1"/>
           </p:cNvSpPr>
@@ -1767,9 +1340,9 @@
           <a:bodyPr/>
           <a:lstStyle/>
           <a:p>
-            <a:fld id="{DBD1CA87-5CDA-1B4E-AFFD-49F944A7DA10}" type="datetimeFigureOut">
-              <a:rPr lang="en-US" smtClean="0"/>
-              <a:t>9/8/16</a:t>
+            <a:fld id="{74EFC610-E518-4248-BDA6-A4C8BE5C5477}" type="datetimeFigureOut">
+              <a:rPr lang="en-US" smtClean="0"/>
+              <a:t>9/12/16</a:t>
             </a:fld>
             <a:endParaRPr lang="en-US"/>
           </a:p>
@@ -1777,7 +1350,7 @@
       </p:sp>
       <p:sp>
         <p:nvSpPr>
-          <p:cNvPr id="8" name="Footer Placeholder 7"/>
+          <p:cNvPr id="6" name="Footer Placeholder 5"/>
           <p:cNvSpPr>
             <a:spLocks noGrp="1"/>
           </p:cNvSpPr>
@@ -1796,7 +1369,7 @@
       </p:sp>
       <p:sp>
         <p:nvSpPr>
-          <p:cNvPr id="9" name="Slide Number Placeholder 8"/>
+          <p:cNvPr id="7" name="Slide Number Placeholder 6"/>
           <p:cNvSpPr>
             <a:spLocks noGrp="1"/>
           </p:cNvSpPr>
@@ -1809,7 +1382,7 @@
           <a:bodyPr/>
           <a:lstStyle/>
           <a:p>
-            <a:fld id="{F626A08C-7AA7-284C-A4EE-A423268B7263}" type="slidenum">
+            <a:fld id="{E0112F47-9B93-9343-892D-7B766A8240CF}" type="slidenum">
               <a:rPr lang="en-US" smtClean="0"/>
               <a:t>‹#›</a:t>
             </a:fld>
@@ -1820,7 +1393,434 @@
     </p:spTree>
     <p:extLst>
       <p:ext uri="{BB962C8B-B14F-4D97-AF65-F5344CB8AC3E}">
-        <p14:creationId xmlns:p14="http://schemas.microsoft.com/office/powerpoint/2010/main" val="2981491071"/>
+        <p14:creationId xmlns:p14="http://schemas.microsoft.com/office/powerpoint/2010/main" val="3250144906"/>
+      </p:ext>
+    </p:extLst>
+  </p:cSld>
+  <p:clrMapOvr>
+    <a:masterClrMapping/>
+  </p:clrMapOvr>
+</p:sldLayout>
+</file>
+
+<file path=ppt/slideLayouts/slideLayout5.xml><?xml version="1.0" encoding="utf-8"?>
+<p:sldLayout xmlns:a="http://schemas.openxmlformats.org/drawingml/2006/main" xmlns:r="http://schemas.openxmlformats.org/officeDocument/2006/relationships" xmlns:p="http://schemas.openxmlformats.org/presentationml/2006/main" type="twoTxTwoObj" preserve="1">
+  <p:cSld name="Comparison">
+    <p:spTree>
+      <p:nvGrpSpPr>
+        <p:cNvPr id="1" name=""/>
+        <p:cNvGrpSpPr/>
+        <p:nvPr/>
+      </p:nvGrpSpPr>
+      <p:grpSpPr>
+        <a:xfrm>
+          <a:off x="0" y="0"/>
+          <a:ext cx="0" cy="0"/>
+          <a:chOff x="0" y="0"/>
+          <a:chExt cx="0" cy="0"/>
+        </a:xfrm>
+      </p:grpSpPr>
+      <p:sp>
+        <p:nvSpPr>
+          <p:cNvPr id="2" name="Title 1"/>
+          <p:cNvSpPr>
+            <a:spLocks noGrp="1"/>
+          </p:cNvSpPr>
+          <p:nvPr>
+            <p:ph type="title"/>
+          </p:nvPr>
+        </p:nvSpPr>
+        <p:spPr>
+          <a:xfrm>
+            <a:off x="137160" y="61158"/>
+            <a:ext cx="2468880" cy="254529"/>
+          </a:xfrm>
+        </p:spPr>
+        <p:txBody>
+          <a:bodyPr/>
+          <a:lstStyle>
+            <a:lvl1pPr>
+              <a:defRPr/>
+            </a:lvl1pPr>
+          </a:lstStyle>
+          <a:p>
+            <a:r>
+              <a:rPr lang="en-US" smtClean="0"/>
+              <a:t>Click to edit Master title style</a:t>
+            </a:r>
+            <a:endParaRPr lang="en-US"/>
+          </a:p>
+        </p:txBody>
+      </p:sp>
+      <p:sp>
+        <p:nvSpPr>
+          <p:cNvPr id="3" name="Text Placeholder 2"/>
+          <p:cNvSpPr>
+            <a:spLocks noGrp="1"/>
+          </p:cNvSpPr>
+          <p:nvPr>
+            <p:ph type="body" idx="1"/>
+          </p:nvPr>
+        </p:nvSpPr>
+        <p:spPr>
+          <a:xfrm>
+            <a:off x="137160" y="341847"/>
+            <a:ext cx="1212056" cy="142466"/>
+          </a:xfrm>
+        </p:spPr>
+        <p:txBody>
+          <a:bodyPr anchor="b"/>
+          <a:lstStyle>
+            <a:lvl1pPr marL="0" indent="0">
+              <a:buNone/>
+              <a:defRPr sz="600" b="1"/>
+            </a:lvl1pPr>
+            <a:lvl2pPr marL="121981" indent="0">
+              <a:buNone/>
+              <a:defRPr sz="500" b="1"/>
+            </a:lvl2pPr>
+            <a:lvl3pPr marL="243962" indent="0">
+              <a:buNone/>
+              <a:defRPr sz="500" b="1"/>
+            </a:lvl3pPr>
+            <a:lvl4pPr marL="365943" indent="0">
+              <a:buNone/>
+              <a:defRPr sz="400" b="1"/>
+            </a:lvl4pPr>
+            <a:lvl5pPr marL="487924" indent="0">
+              <a:buNone/>
+              <a:defRPr sz="400" b="1"/>
+            </a:lvl5pPr>
+            <a:lvl6pPr marL="609905" indent="0">
+              <a:buNone/>
+              <a:defRPr sz="400" b="1"/>
+            </a:lvl6pPr>
+            <a:lvl7pPr marL="731886" indent="0">
+              <a:buNone/>
+              <a:defRPr sz="400" b="1"/>
+            </a:lvl7pPr>
+            <a:lvl8pPr marL="853867" indent="0">
+              <a:buNone/>
+              <a:defRPr sz="400" b="1"/>
+            </a:lvl8pPr>
+            <a:lvl9pPr marL="975848" indent="0">
+              <a:buNone/>
+              <a:defRPr sz="400" b="1"/>
+            </a:lvl9pPr>
+          </a:lstStyle>
+          <a:p>
+            <a:pPr lvl="0"/>
+            <a:r>
+              <a:rPr lang="en-US" smtClean="0"/>
+              <a:t>Click to edit Master text styles</a:t>
+            </a:r>
+          </a:p>
+        </p:txBody>
+      </p:sp>
+      <p:sp>
+        <p:nvSpPr>
+          <p:cNvPr id="4" name="Content Placeholder 3"/>
+          <p:cNvSpPr>
+            <a:spLocks noGrp="1"/>
+          </p:cNvSpPr>
+          <p:nvPr>
+            <p:ph sz="half" idx="2"/>
+          </p:nvPr>
+        </p:nvSpPr>
+        <p:spPr>
+          <a:xfrm>
+            <a:off x="137160" y="484313"/>
+            <a:ext cx="1212056" cy="879893"/>
+          </a:xfrm>
+        </p:spPr>
+        <p:txBody>
+          <a:bodyPr/>
+          <a:lstStyle>
+            <a:lvl1pPr>
+              <a:defRPr sz="600"/>
+            </a:lvl1pPr>
+            <a:lvl2pPr>
+              <a:defRPr sz="500"/>
+            </a:lvl2pPr>
+            <a:lvl3pPr>
+              <a:defRPr sz="500"/>
+            </a:lvl3pPr>
+            <a:lvl4pPr>
+              <a:defRPr sz="400"/>
+            </a:lvl4pPr>
+            <a:lvl5pPr>
+              <a:defRPr sz="400"/>
+            </a:lvl5pPr>
+            <a:lvl6pPr>
+              <a:defRPr sz="400"/>
+            </a:lvl6pPr>
+            <a:lvl7pPr>
+              <a:defRPr sz="400"/>
+            </a:lvl7pPr>
+            <a:lvl8pPr>
+              <a:defRPr sz="400"/>
+            </a:lvl8pPr>
+            <a:lvl9pPr>
+              <a:defRPr sz="400"/>
+            </a:lvl9pPr>
+          </a:lstStyle>
+          <a:p>
+            <a:pPr lvl="0"/>
+            <a:r>
+              <a:rPr lang="en-US" smtClean="0"/>
+              <a:t>Click to edit Master text styles</a:t>
+            </a:r>
+          </a:p>
+          <a:p>
+            <a:pPr lvl="1"/>
+            <a:r>
+              <a:rPr lang="en-US" smtClean="0"/>
+              <a:t>Second level</a:t>
+            </a:r>
+          </a:p>
+          <a:p>
+            <a:pPr lvl="2"/>
+            <a:r>
+              <a:rPr lang="en-US" smtClean="0"/>
+              <a:t>Third level</a:t>
+            </a:r>
+          </a:p>
+          <a:p>
+            <a:pPr lvl="3"/>
+            <a:r>
+              <a:rPr lang="en-US" smtClean="0"/>
+              <a:t>Fourth level</a:t>
+            </a:r>
+          </a:p>
+          <a:p>
+            <a:pPr lvl="4"/>
+            <a:r>
+              <a:rPr lang="en-US" smtClean="0"/>
+              <a:t>Fifth level</a:t>
+            </a:r>
+            <a:endParaRPr lang="en-US"/>
+          </a:p>
+        </p:txBody>
+      </p:sp>
+      <p:sp>
+        <p:nvSpPr>
+          <p:cNvPr id="5" name="Text Placeholder 4"/>
+          <p:cNvSpPr>
+            <a:spLocks noGrp="1"/>
+          </p:cNvSpPr>
+          <p:nvPr>
+            <p:ph type="body" sz="quarter" idx="3"/>
+          </p:nvPr>
+        </p:nvSpPr>
+        <p:spPr>
+          <a:xfrm>
+            <a:off x="1393507" y="341847"/>
+            <a:ext cx="1212533" cy="142466"/>
+          </a:xfrm>
+        </p:spPr>
+        <p:txBody>
+          <a:bodyPr anchor="b"/>
+          <a:lstStyle>
+            <a:lvl1pPr marL="0" indent="0">
+              <a:buNone/>
+              <a:defRPr sz="600" b="1"/>
+            </a:lvl1pPr>
+            <a:lvl2pPr marL="121981" indent="0">
+              <a:buNone/>
+              <a:defRPr sz="500" b="1"/>
+            </a:lvl2pPr>
+            <a:lvl3pPr marL="243962" indent="0">
+              <a:buNone/>
+              <a:defRPr sz="500" b="1"/>
+            </a:lvl3pPr>
+            <a:lvl4pPr marL="365943" indent="0">
+              <a:buNone/>
+              <a:defRPr sz="400" b="1"/>
+            </a:lvl4pPr>
+            <a:lvl5pPr marL="487924" indent="0">
+              <a:buNone/>
+              <a:defRPr sz="400" b="1"/>
+            </a:lvl5pPr>
+            <a:lvl6pPr marL="609905" indent="0">
+              <a:buNone/>
+              <a:defRPr sz="400" b="1"/>
+            </a:lvl6pPr>
+            <a:lvl7pPr marL="731886" indent="0">
+              <a:buNone/>
+              <a:defRPr sz="400" b="1"/>
+            </a:lvl7pPr>
+            <a:lvl8pPr marL="853867" indent="0">
+              <a:buNone/>
+              <a:defRPr sz="400" b="1"/>
+            </a:lvl8pPr>
+            <a:lvl9pPr marL="975848" indent="0">
+              <a:buNone/>
+              <a:defRPr sz="400" b="1"/>
+            </a:lvl9pPr>
+          </a:lstStyle>
+          <a:p>
+            <a:pPr lvl="0"/>
+            <a:r>
+              <a:rPr lang="en-US" smtClean="0"/>
+              <a:t>Click to edit Master text styles</a:t>
+            </a:r>
+          </a:p>
+        </p:txBody>
+      </p:sp>
+      <p:sp>
+        <p:nvSpPr>
+          <p:cNvPr id="6" name="Content Placeholder 5"/>
+          <p:cNvSpPr>
+            <a:spLocks noGrp="1"/>
+          </p:cNvSpPr>
+          <p:nvPr>
+            <p:ph sz="quarter" idx="4"/>
+          </p:nvPr>
+        </p:nvSpPr>
+        <p:spPr>
+          <a:xfrm>
+            <a:off x="1393507" y="484313"/>
+            <a:ext cx="1212533" cy="879893"/>
+          </a:xfrm>
+        </p:spPr>
+        <p:txBody>
+          <a:bodyPr/>
+          <a:lstStyle>
+            <a:lvl1pPr>
+              <a:defRPr sz="600"/>
+            </a:lvl1pPr>
+            <a:lvl2pPr>
+              <a:defRPr sz="500"/>
+            </a:lvl2pPr>
+            <a:lvl3pPr>
+              <a:defRPr sz="500"/>
+            </a:lvl3pPr>
+            <a:lvl4pPr>
+              <a:defRPr sz="400"/>
+            </a:lvl4pPr>
+            <a:lvl5pPr>
+              <a:defRPr sz="400"/>
+            </a:lvl5pPr>
+            <a:lvl6pPr>
+              <a:defRPr sz="400"/>
+            </a:lvl6pPr>
+            <a:lvl7pPr>
+              <a:defRPr sz="400"/>
+            </a:lvl7pPr>
+            <a:lvl8pPr>
+              <a:defRPr sz="400"/>
+            </a:lvl8pPr>
+            <a:lvl9pPr>
+              <a:defRPr sz="400"/>
+            </a:lvl9pPr>
+          </a:lstStyle>
+          <a:p>
+            <a:pPr lvl="0"/>
+            <a:r>
+              <a:rPr lang="en-US" smtClean="0"/>
+              <a:t>Click to edit Master text styles</a:t>
+            </a:r>
+          </a:p>
+          <a:p>
+            <a:pPr lvl="1"/>
+            <a:r>
+              <a:rPr lang="en-US" smtClean="0"/>
+              <a:t>Second level</a:t>
+            </a:r>
+          </a:p>
+          <a:p>
+            <a:pPr lvl="2"/>
+            <a:r>
+              <a:rPr lang="en-US" smtClean="0"/>
+              <a:t>Third level</a:t>
+            </a:r>
+          </a:p>
+          <a:p>
+            <a:pPr lvl="3"/>
+            <a:r>
+              <a:rPr lang="en-US" smtClean="0"/>
+              <a:t>Fourth level</a:t>
+            </a:r>
+          </a:p>
+          <a:p>
+            <a:pPr lvl="4"/>
+            <a:r>
+              <a:rPr lang="en-US" smtClean="0"/>
+              <a:t>Fifth level</a:t>
+            </a:r>
+            <a:endParaRPr lang="en-US"/>
+          </a:p>
+        </p:txBody>
+      </p:sp>
+      <p:sp>
+        <p:nvSpPr>
+          <p:cNvPr id="7" name="Date Placeholder 6"/>
+          <p:cNvSpPr>
+            <a:spLocks noGrp="1"/>
+          </p:cNvSpPr>
+          <p:nvPr>
+            <p:ph type="dt" sz="half" idx="10"/>
+          </p:nvPr>
+        </p:nvSpPr>
+        <p:spPr/>
+        <p:txBody>
+          <a:bodyPr/>
+          <a:lstStyle/>
+          <a:p>
+            <a:fld id="{74EFC610-E518-4248-BDA6-A4C8BE5C5477}" type="datetimeFigureOut">
+              <a:rPr lang="en-US" smtClean="0"/>
+              <a:t>9/12/16</a:t>
+            </a:fld>
+            <a:endParaRPr lang="en-US"/>
+          </a:p>
+        </p:txBody>
+      </p:sp>
+      <p:sp>
+        <p:nvSpPr>
+          <p:cNvPr id="8" name="Footer Placeholder 7"/>
+          <p:cNvSpPr>
+            <a:spLocks noGrp="1"/>
+          </p:cNvSpPr>
+          <p:nvPr>
+            <p:ph type="ftr" sz="quarter" idx="11"/>
+          </p:nvPr>
+        </p:nvSpPr>
+        <p:spPr/>
+        <p:txBody>
+          <a:bodyPr/>
+          <a:lstStyle/>
+          <a:p>
+            <a:endParaRPr lang="en-US"/>
+          </a:p>
+        </p:txBody>
+      </p:sp>
+      <p:sp>
+        <p:nvSpPr>
+          <p:cNvPr id="9" name="Slide Number Placeholder 8"/>
+          <p:cNvSpPr>
+            <a:spLocks noGrp="1"/>
+          </p:cNvSpPr>
+          <p:nvPr>
+            <p:ph type="sldNum" sz="quarter" idx="12"/>
+          </p:nvPr>
+        </p:nvSpPr>
+        <p:spPr/>
+        <p:txBody>
+          <a:bodyPr/>
+          <a:lstStyle/>
+          <a:p>
+            <a:fld id="{E0112F47-9B93-9343-892D-7B766A8240CF}" type="slidenum">
+              <a:rPr lang="en-US" smtClean="0"/>
+              <a:t>‹#›</a:t>
+            </a:fld>
+            <a:endParaRPr lang="en-US"/>
+          </a:p>
+        </p:txBody>
+      </p:sp>
+    </p:spTree>
+    <p:extLst>
+      <p:ext uri="{BB962C8B-B14F-4D97-AF65-F5344CB8AC3E}">
+        <p14:creationId xmlns:p14="http://schemas.microsoft.com/office/powerpoint/2010/main" val="3832852227"/>
       </p:ext>
     </p:extLst>
   </p:cSld>
@@ -1885,9 +1885,9 @@
           <a:bodyPr/>
           <a:lstStyle/>
           <a:p>
-            <a:fld id="{DBD1CA87-5CDA-1B4E-AFFD-49F944A7DA10}" type="datetimeFigureOut">
-              <a:rPr lang="en-US" smtClean="0"/>
-              <a:t>9/8/16</a:t>
+            <a:fld id="{74EFC610-E518-4248-BDA6-A4C8BE5C5477}" type="datetimeFigureOut">
+              <a:rPr lang="en-US" smtClean="0"/>
+              <a:t>9/12/16</a:t>
             </a:fld>
             <a:endParaRPr lang="en-US"/>
           </a:p>
@@ -1927,7 +1927,7 @@
           <a:bodyPr/>
           <a:lstStyle/>
           <a:p>
-            <a:fld id="{F626A08C-7AA7-284C-A4EE-A423268B7263}" type="slidenum">
+            <a:fld id="{E0112F47-9B93-9343-892D-7B766A8240CF}" type="slidenum">
               <a:rPr lang="en-US" smtClean="0"/>
               <a:t>‹#›</a:t>
             </a:fld>
@@ -1938,7 +1938,7 @@
     </p:spTree>
     <p:extLst>
       <p:ext uri="{BB962C8B-B14F-4D97-AF65-F5344CB8AC3E}">
-        <p14:creationId xmlns:p14="http://schemas.microsoft.com/office/powerpoint/2010/main" val="3837836711"/>
+        <p14:creationId xmlns:p14="http://schemas.microsoft.com/office/powerpoint/2010/main" val="1930320427"/>
       </p:ext>
     </p:extLst>
   </p:cSld>
@@ -1980,9 +1980,9 @@
           <a:bodyPr/>
           <a:lstStyle/>
           <a:p>
-            <a:fld id="{DBD1CA87-5CDA-1B4E-AFFD-49F944A7DA10}" type="datetimeFigureOut">
-              <a:rPr lang="en-US" smtClean="0"/>
-              <a:t>9/8/16</a:t>
+            <a:fld id="{74EFC610-E518-4248-BDA6-A4C8BE5C5477}" type="datetimeFigureOut">
+              <a:rPr lang="en-US" smtClean="0"/>
+              <a:t>9/12/16</a:t>
             </a:fld>
             <a:endParaRPr lang="en-US"/>
           </a:p>
@@ -2022,7 +2022,7 @@
           <a:bodyPr/>
           <a:lstStyle/>
           <a:p>
-            <a:fld id="{F626A08C-7AA7-284C-A4EE-A423268B7263}" type="slidenum">
+            <a:fld id="{E0112F47-9B93-9343-892D-7B766A8240CF}" type="slidenum">
               <a:rPr lang="en-US" smtClean="0"/>
               <a:t>‹#›</a:t>
             </a:fld>
@@ -2033,7 +2033,7 @@
     </p:spTree>
     <p:extLst>
       <p:ext uri="{BB962C8B-B14F-4D97-AF65-F5344CB8AC3E}">
-        <p14:creationId xmlns:p14="http://schemas.microsoft.com/office/powerpoint/2010/main" val="2801403420"/>
+        <p14:creationId xmlns:p14="http://schemas.microsoft.com/office/powerpoint/2010/main" val="2557453391"/>
       </p:ext>
     </p:extLst>
   </p:cSld>
@@ -2072,15 +2072,15 @@
         </p:nvSpPr>
         <p:spPr>
           <a:xfrm>
-            <a:off x="137160" y="72813"/>
-            <a:ext cx="902494" cy="309880"/>
+            <a:off x="137160" y="60804"/>
+            <a:ext cx="902494" cy="258771"/>
           </a:xfrm>
         </p:spPr>
         <p:txBody>
           <a:bodyPr anchor="b"/>
           <a:lstStyle>
             <a:lvl1pPr algn="l">
-              <a:defRPr sz="600" b="1"/>
+              <a:defRPr sz="500" b="1"/>
             </a:lvl1pPr>
           </a:lstStyle>
           <a:p>
@@ -2104,8 +2104,8 @@
         </p:nvSpPr>
         <p:spPr>
           <a:xfrm>
-            <a:off x="1072515" y="72814"/>
-            <a:ext cx="1533525" cy="1560830"/>
+            <a:off x="1072515" y="60804"/>
+            <a:ext cx="1533525" cy="1303402"/>
           </a:xfrm>
         </p:spPr>
         <p:txBody>
@@ -2115,28 +2115,28 @@
               <a:defRPr sz="900"/>
             </a:lvl1pPr>
             <a:lvl2pPr>
-              <a:defRPr sz="800"/>
+              <a:defRPr sz="700"/>
             </a:lvl2pPr>
             <a:lvl3pPr>
-              <a:defRPr sz="700"/>
+              <a:defRPr sz="600"/>
             </a:lvl3pPr>
             <a:lvl4pPr>
-              <a:defRPr sz="600"/>
+              <a:defRPr sz="500"/>
             </a:lvl4pPr>
             <a:lvl5pPr>
-              <a:defRPr sz="600"/>
+              <a:defRPr sz="500"/>
             </a:lvl5pPr>
             <a:lvl6pPr>
-              <a:defRPr sz="600"/>
+              <a:defRPr sz="500"/>
             </a:lvl6pPr>
             <a:lvl7pPr>
-              <a:defRPr sz="600"/>
+              <a:defRPr sz="500"/>
             </a:lvl7pPr>
             <a:lvl8pPr>
-              <a:defRPr sz="600"/>
+              <a:defRPr sz="500"/>
             </a:lvl8pPr>
             <a:lvl9pPr>
-              <a:defRPr sz="600"/>
+              <a:defRPr sz="500"/>
             </a:lvl9pPr>
           </a:lstStyle>
           <a:p>
@@ -2189,8 +2189,8 @@
         </p:nvSpPr>
         <p:spPr>
           <a:xfrm>
-            <a:off x="137160" y="382694"/>
-            <a:ext cx="902494" cy="1250950"/>
+            <a:off x="137160" y="319576"/>
+            <a:ext cx="902494" cy="1044630"/>
           </a:xfrm>
         </p:spPr>
         <p:txBody>
@@ -2200,37 +2200,37 @@
               <a:buNone/>
               <a:defRPr sz="400"/>
             </a:lvl1pPr>
-            <a:lvl2pPr marL="130622" indent="0">
+            <a:lvl2pPr marL="121981" indent="0">
               <a:buNone/>
               <a:defRPr sz="300"/>
             </a:lvl2pPr>
-            <a:lvl3pPr marL="261244" indent="0">
+            <a:lvl3pPr marL="243962" indent="0">
               <a:buNone/>
               <a:defRPr sz="300"/>
             </a:lvl3pPr>
-            <a:lvl4pPr marL="391866" indent="0">
-              <a:buNone/>
-              <a:defRPr sz="300"/>
+            <a:lvl4pPr marL="365943" indent="0">
+              <a:buNone/>
+              <a:defRPr sz="200"/>
             </a:lvl4pPr>
-            <a:lvl5pPr marL="522488" indent="0">
-              <a:buNone/>
-              <a:defRPr sz="300"/>
+            <a:lvl5pPr marL="487924" indent="0">
+              <a:buNone/>
+              <a:defRPr sz="200"/>
             </a:lvl5pPr>
-            <a:lvl6pPr marL="653110" indent="0">
-              <a:buNone/>
-              <a:defRPr sz="300"/>
+            <a:lvl6pPr marL="609905" indent="0">
+              <a:buNone/>
+              <a:defRPr sz="200"/>
             </a:lvl6pPr>
-            <a:lvl7pPr marL="783732" indent="0">
-              <a:buNone/>
-              <a:defRPr sz="300"/>
+            <a:lvl7pPr marL="731886" indent="0">
+              <a:buNone/>
+              <a:defRPr sz="200"/>
             </a:lvl7pPr>
-            <a:lvl8pPr marL="914354" indent="0">
-              <a:buNone/>
-              <a:defRPr sz="300"/>
+            <a:lvl8pPr marL="853867" indent="0">
+              <a:buNone/>
+              <a:defRPr sz="200"/>
             </a:lvl8pPr>
-            <a:lvl9pPr marL="1044976" indent="0">
-              <a:buNone/>
-              <a:defRPr sz="300"/>
+            <a:lvl9pPr marL="975848" indent="0">
+              <a:buNone/>
+              <a:defRPr sz="200"/>
             </a:lvl9pPr>
           </a:lstStyle>
           <a:p>
@@ -2257,9 +2257,9 @@
           <a:bodyPr/>
           <a:lstStyle/>
           <a:p>
-            <a:fld id="{DBD1CA87-5CDA-1B4E-AFFD-49F944A7DA10}" type="datetimeFigureOut">
-              <a:rPr lang="en-US" smtClean="0"/>
-              <a:t>9/8/16</a:t>
+            <a:fld id="{74EFC610-E518-4248-BDA6-A4C8BE5C5477}" type="datetimeFigureOut">
+              <a:rPr lang="en-US" smtClean="0"/>
+              <a:t>9/12/16</a:t>
             </a:fld>
             <a:endParaRPr lang="en-US"/>
           </a:p>
@@ -2299,7 +2299,7 @@
           <a:bodyPr/>
           <a:lstStyle/>
           <a:p>
-            <a:fld id="{F626A08C-7AA7-284C-A4EE-A423268B7263}" type="slidenum">
+            <a:fld id="{E0112F47-9B93-9343-892D-7B766A8240CF}" type="slidenum">
               <a:rPr lang="en-US" smtClean="0"/>
               <a:t>‹#›</a:t>
             </a:fld>
@@ -2310,7 +2310,7 @@
     </p:spTree>
     <p:extLst>
       <p:ext uri="{BB962C8B-B14F-4D97-AF65-F5344CB8AC3E}">
-        <p14:creationId xmlns:p14="http://schemas.microsoft.com/office/powerpoint/2010/main" val="1292094870"/>
+        <p14:creationId xmlns:p14="http://schemas.microsoft.com/office/powerpoint/2010/main" val="1491266367"/>
       </p:ext>
     </p:extLst>
   </p:cSld>
@@ -2349,15 +2349,15 @@
         </p:nvSpPr>
         <p:spPr>
           <a:xfrm>
-            <a:off x="537686" y="1280160"/>
-            <a:ext cx="1645920" cy="151130"/>
+            <a:off x="537686" y="1069023"/>
+            <a:ext cx="1645920" cy="126204"/>
           </a:xfrm>
         </p:spPr>
         <p:txBody>
           <a:bodyPr anchor="b"/>
           <a:lstStyle>
             <a:lvl1pPr algn="l">
-              <a:defRPr sz="600" b="1"/>
+              <a:defRPr sz="500" b="1"/>
             </a:lvl1pPr>
           </a:lstStyle>
           <a:p>
@@ -2381,8 +2381,8 @@
         </p:nvSpPr>
         <p:spPr>
           <a:xfrm>
-            <a:off x="537686" y="163407"/>
-            <a:ext cx="1645920" cy="1097280"/>
+            <a:off x="537686" y="136456"/>
+            <a:ext cx="1645920" cy="916305"/>
           </a:xfrm>
         </p:spPr>
         <p:txBody>
@@ -2392,37 +2392,37 @@
               <a:buNone/>
               <a:defRPr sz="900"/>
             </a:lvl1pPr>
-            <a:lvl2pPr marL="130622" indent="0">
-              <a:buNone/>
-              <a:defRPr sz="800"/>
+            <a:lvl2pPr marL="121981" indent="0">
+              <a:buNone/>
+              <a:defRPr sz="700"/>
             </a:lvl2pPr>
-            <a:lvl3pPr marL="261244" indent="0">
-              <a:buNone/>
-              <a:defRPr sz="700"/>
+            <a:lvl3pPr marL="243962" indent="0">
+              <a:buNone/>
+              <a:defRPr sz="600"/>
             </a:lvl3pPr>
-            <a:lvl4pPr marL="391866" indent="0">
-              <a:buNone/>
-              <a:defRPr sz="600"/>
+            <a:lvl4pPr marL="365943" indent="0">
+              <a:buNone/>
+              <a:defRPr sz="500"/>
             </a:lvl4pPr>
-            <a:lvl5pPr marL="522488" indent="0">
-              <a:buNone/>
-              <a:defRPr sz="600"/>
+            <a:lvl5pPr marL="487924" indent="0">
+              <a:buNone/>
+              <a:defRPr sz="500"/>
             </a:lvl5pPr>
-            <a:lvl6pPr marL="653110" indent="0">
-              <a:buNone/>
-              <a:defRPr sz="600"/>
+            <a:lvl6pPr marL="609905" indent="0">
+              <a:buNone/>
+              <a:defRPr sz="500"/>
             </a:lvl6pPr>
-            <a:lvl7pPr marL="783732" indent="0">
-              <a:buNone/>
-              <a:defRPr sz="600"/>
+            <a:lvl7pPr marL="731886" indent="0">
+              <a:buNone/>
+              <a:defRPr sz="500"/>
             </a:lvl7pPr>
-            <a:lvl8pPr marL="914354" indent="0">
-              <a:buNone/>
-              <a:defRPr sz="600"/>
+            <a:lvl8pPr marL="853867" indent="0">
+              <a:buNone/>
+              <a:defRPr sz="500"/>
             </a:lvl8pPr>
-            <a:lvl9pPr marL="1044976" indent="0">
-              <a:buNone/>
-              <a:defRPr sz="600"/>
+            <a:lvl9pPr marL="975848" indent="0">
+              <a:buNone/>
+              <a:defRPr sz="500"/>
             </a:lvl9pPr>
           </a:lstStyle>
           <a:p>
@@ -2442,8 +2442,8 @@
         </p:nvSpPr>
         <p:spPr>
           <a:xfrm>
-            <a:off x="537686" y="1431290"/>
-            <a:ext cx="1645920" cy="214630"/>
+            <a:off x="537686" y="1195227"/>
+            <a:ext cx="1645920" cy="179231"/>
           </a:xfrm>
         </p:spPr>
         <p:txBody>
@@ -2453,37 +2453,37 @@
               <a:buNone/>
               <a:defRPr sz="400"/>
             </a:lvl1pPr>
-            <a:lvl2pPr marL="130622" indent="0">
+            <a:lvl2pPr marL="121981" indent="0">
               <a:buNone/>
               <a:defRPr sz="300"/>
             </a:lvl2pPr>
-            <a:lvl3pPr marL="261244" indent="0">
+            <a:lvl3pPr marL="243962" indent="0">
               <a:buNone/>
               <a:defRPr sz="300"/>
             </a:lvl3pPr>
-            <a:lvl4pPr marL="391866" indent="0">
-              <a:buNone/>
-              <a:defRPr sz="300"/>
+            <a:lvl4pPr marL="365943" indent="0">
+              <a:buNone/>
+              <a:defRPr sz="200"/>
             </a:lvl4pPr>
-            <a:lvl5pPr marL="522488" indent="0">
-              <a:buNone/>
-              <a:defRPr sz="300"/>
+            <a:lvl5pPr marL="487924" indent="0">
+              <a:buNone/>
+              <a:defRPr sz="200"/>
             </a:lvl5pPr>
-            <a:lvl6pPr marL="653110" indent="0">
-              <a:buNone/>
-              <a:defRPr sz="300"/>
+            <a:lvl6pPr marL="609905" indent="0">
+              <a:buNone/>
+              <a:defRPr sz="200"/>
             </a:lvl6pPr>
-            <a:lvl7pPr marL="783732" indent="0">
-              <a:buNone/>
-              <a:defRPr sz="300"/>
+            <a:lvl7pPr marL="731886" indent="0">
+              <a:buNone/>
+              <a:defRPr sz="200"/>
             </a:lvl7pPr>
-            <a:lvl8pPr marL="914354" indent="0">
-              <a:buNone/>
-              <a:defRPr sz="300"/>
+            <a:lvl8pPr marL="853867" indent="0">
+              <a:buNone/>
+              <a:defRPr sz="200"/>
             </a:lvl8pPr>
-            <a:lvl9pPr marL="1044976" indent="0">
-              <a:buNone/>
-              <a:defRPr sz="300"/>
+            <a:lvl9pPr marL="975848" indent="0">
+              <a:buNone/>
+              <a:defRPr sz="200"/>
             </a:lvl9pPr>
           </a:lstStyle>
           <a:p>
@@ -2510,9 +2510,9 @@
           <a:bodyPr/>
           <a:lstStyle/>
           <a:p>
-            <a:fld id="{DBD1CA87-5CDA-1B4E-AFFD-49F944A7DA10}" type="datetimeFigureOut">
-              <a:rPr lang="en-US" smtClean="0"/>
-              <a:t>9/8/16</a:t>
+            <a:fld id="{74EFC610-E518-4248-BDA6-A4C8BE5C5477}" type="datetimeFigureOut">
+              <a:rPr lang="en-US" smtClean="0"/>
+              <a:t>9/12/16</a:t>
             </a:fld>
             <a:endParaRPr lang="en-US"/>
           </a:p>
@@ -2552,7 +2552,7 @@
           <a:bodyPr/>
           <a:lstStyle/>
           <a:p>
-            <a:fld id="{F626A08C-7AA7-284C-A4EE-A423268B7263}" type="slidenum">
+            <a:fld id="{E0112F47-9B93-9343-892D-7B766A8240CF}" type="slidenum">
               <a:rPr lang="en-US" smtClean="0"/>
               <a:t>‹#›</a:t>
             </a:fld>
@@ -2563,7 +2563,7 @@
     </p:spTree>
     <p:extLst>
       <p:ext uri="{BB962C8B-B14F-4D97-AF65-F5344CB8AC3E}">
-        <p14:creationId xmlns:p14="http://schemas.microsoft.com/office/powerpoint/2010/main" val="1692159846"/>
+        <p14:creationId xmlns:p14="http://schemas.microsoft.com/office/powerpoint/2010/main" val="290043108"/>
       </p:ext>
     </p:extLst>
   </p:cSld>
@@ -2607,15 +2607,15 @@
         </p:nvSpPr>
         <p:spPr>
           <a:xfrm>
-            <a:off x="137160" y="73237"/>
-            <a:ext cx="2468880" cy="304800"/>
+            <a:off x="137160" y="61158"/>
+            <a:ext cx="2468880" cy="254529"/>
           </a:xfrm>
           <a:prstGeom prst="rect">
             <a:avLst/>
           </a:prstGeom>
         </p:spPr>
         <p:txBody>
-          <a:bodyPr vert="horz" lIns="26124" tIns="13062" rIns="26124" bIns="13062" rtlCol="0" anchor="ctr">
+          <a:bodyPr vert="horz" lIns="24396" tIns="12198" rIns="24396" bIns="12198" rtlCol="0" anchor="ctr">
             <a:normAutofit/>
           </a:bodyPr>
           <a:lstStyle/>
@@ -2640,15 +2640,15 @@
         </p:nvSpPr>
         <p:spPr>
           <a:xfrm>
-            <a:off x="137160" y="426720"/>
-            <a:ext cx="2468880" cy="1206923"/>
+            <a:off x="137160" y="356341"/>
+            <a:ext cx="2468880" cy="1007865"/>
           </a:xfrm>
           <a:prstGeom prst="rect">
             <a:avLst/>
           </a:prstGeom>
         </p:spPr>
         <p:txBody>
-          <a:bodyPr vert="horz" lIns="26124" tIns="13062" rIns="26124" bIns="13062" rtlCol="0">
+          <a:bodyPr vert="horz" lIns="24396" tIns="12198" rIns="24396" bIns="12198" rtlCol="0">
             <a:normAutofit/>
           </a:bodyPr>
           <a:lstStyle/>
@@ -2702,15 +2702,15 @@
         </p:nvSpPr>
         <p:spPr>
           <a:xfrm>
-            <a:off x="137160" y="1695027"/>
-            <a:ext cx="640080" cy="97367"/>
+            <a:off x="137160" y="1415465"/>
+            <a:ext cx="640080" cy="81308"/>
           </a:xfrm>
           <a:prstGeom prst="rect">
             <a:avLst/>
           </a:prstGeom>
         </p:spPr>
         <p:txBody>
-          <a:bodyPr vert="horz" lIns="26124" tIns="13062" rIns="26124" bIns="13062" rtlCol="0" anchor="ctr"/>
+          <a:bodyPr vert="horz" lIns="24396" tIns="12198" rIns="24396" bIns="12198" rtlCol="0" anchor="ctr"/>
           <a:lstStyle>
             <a:lvl1pPr algn="l">
               <a:defRPr sz="300">
@@ -2723,9 +2723,9 @@
             </a:lvl1pPr>
           </a:lstStyle>
           <a:p>
-            <a:fld id="{DBD1CA87-5CDA-1B4E-AFFD-49F944A7DA10}" type="datetimeFigureOut">
-              <a:rPr lang="en-US" smtClean="0"/>
-              <a:t>9/8/16</a:t>
+            <a:fld id="{74EFC610-E518-4248-BDA6-A4C8BE5C5477}" type="datetimeFigureOut">
+              <a:rPr lang="en-US" smtClean="0"/>
+              <a:t>9/12/16</a:t>
             </a:fld>
             <a:endParaRPr lang="en-US"/>
           </a:p>
@@ -2743,15 +2743,15 @@
         </p:nvSpPr>
         <p:spPr>
           <a:xfrm>
-            <a:off x="937260" y="1695027"/>
-            <a:ext cx="868680" cy="97367"/>
+            <a:off x="937260" y="1415465"/>
+            <a:ext cx="868680" cy="81308"/>
           </a:xfrm>
           <a:prstGeom prst="rect">
             <a:avLst/>
           </a:prstGeom>
         </p:spPr>
         <p:txBody>
-          <a:bodyPr vert="horz" lIns="26124" tIns="13062" rIns="26124" bIns="13062" rtlCol="0" anchor="ctr"/>
+          <a:bodyPr vert="horz" lIns="24396" tIns="12198" rIns="24396" bIns="12198" rtlCol="0" anchor="ctr"/>
           <a:lstStyle>
             <a:lvl1pPr algn="ctr">
               <a:defRPr sz="300">
@@ -2780,15 +2780,15 @@
         </p:nvSpPr>
         <p:spPr>
           <a:xfrm>
-            <a:off x="1965960" y="1695027"/>
-            <a:ext cx="640080" cy="97367"/>
+            <a:off x="1965960" y="1415465"/>
+            <a:ext cx="640080" cy="81308"/>
           </a:xfrm>
           <a:prstGeom prst="rect">
             <a:avLst/>
           </a:prstGeom>
         </p:spPr>
         <p:txBody>
-          <a:bodyPr vert="horz" lIns="26124" tIns="13062" rIns="26124" bIns="13062" rtlCol="0" anchor="ctr"/>
+          <a:bodyPr vert="horz" lIns="24396" tIns="12198" rIns="24396" bIns="12198" rtlCol="0" anchor="ctr"/>
           <a:lstStyle>
             <a:lvl1pPr algn="r">
               <a:defRPr sz="300">
@@ -2801,7 +2801,7 @@
             </a:lvl1pPr>
           </a:lstStyle>
           <a:p>
-            <a:fld id="{F626A08C-7AA7-284C-A4EE-A423268B7263}" type="slidenum">
+            <a:fld id="{E0112F47-9B93-9343-892D-7B766A8240CF}" type="slidenum">
               <a:rPr lang="en-US" smtClean="0"/>
               <a:t>‹#›</a:t>
             </a:fld>
@@ -2812,7 +2812,7 @@
     </p:spTree>
     <p:extLst>
       <p:ext uri="{BB962C8B-B14F-4D97-AF65-F5344CB8AC3E}">
-        <p14:creationId xmlns:p14="http://schemas.microsoft.com/office/powerpoint/2010/main" val="2969610520"/>
+        <p14:creationId xmlns:p14="http://schemas.microsoft.com/office/powerpoint/2010/main" val="3035319156"/>
       </p:ext>
     </p:extLst>
   </p:cSld>
@@ -2832,12 +2832,12 @@
   </p:sldLayoutIdLst>
   <p:txStyles>
     <p:titleStyle>
-      <a:lvl1pPr algn="ctr" defTabSz="130622" rtl="0" eaLnBrk="1" latinLnBrk="0" hangingPunct="1">
+      <a:lvl1pPr algn="ctr" defTabSz="121981" rtl="0" eaLnBrk="1" latinLnBrk="0" hangingPunct="1">
         <a:spcBef>
           <a:spcPct val="0"/>
         </a:spcBef>
         <a:buNone/>
-        <a:defRPr sz="1300" kern="1200">
+        <a:defRPr sz="1200" kern="1200">
           <a:solidFill>
             <a:schemeClr val="tx1"/>
           </a:solidFill>
@@ -2848,7 +2848,7 @@
       </a:lvl1pPr>
     </p:titleStyle>
     <p:bodyStyle>
-      <a:lvl1pPr marL="97967" indent="-97967" algn="l" defTabSz="130622" rtl="0" eaLnBrk="1" latinLnBrk="0" hangingPunct="1">
+      <a:lvl1pPr marL="91486" indent="-91486" algn="l" defTabSz="121981" rtl="0" eaLnBrk="1" latinLnBrk="0" hangingPunct="1">
         <a:spcBef>
           <a:spcPct val="20000"/>
         </a:spcBef>
@@ -2863,13 +2863,13 @@
           <a:cs typeface="+mn-cs"/>
         </a:defRPr>
       </a:lvl1pPr>
-      <a:lvl2pPr marL="212261" indent="-81639" algn="l" defTabSz="130622" rtl="0" eaLnBrk="1" latinLnBrk="0" hangingPunct="1">
+      <a:lvl2pPr marL="198219" indent="-76238" algn="l" defTabSz="121981" rtl="0" eaLnBrk="1" latinLnBrk="0" hangingPunct="1">
         <a:spcBef>
           <a:spcPct val="20000"/>
         </a:spcBef>
         <a:buFont typeface="Arial"/>
         <a:buChar char="–"/>
-        <a:defRPr sz="800" kern="1200">
+        <a:defRPr sz="700" kern="1200">
           <a:solidFill>
             <a:schemeClr val="tx1"/>
           </a:solidFill>
@@ -2878,52 +2878,7 @@
           <a:cs typeface="+mn-cs"/>
         </a:defRPr>
       </a:lvl2pPr>
-      <a:lvl3pPr marL="326555" indent="-65311" algn="l" defTabSz="130622" rtl="0" eaLnBrk="1" latinLnBrk="0" hangingPunct="1">
-        <a:spcBef>
-          <a:spcPct val="20000"/>
-        </a:spcBef>
-        <a:buFont typeface="Arial"/>
-        <a:buChar char="•"/>
-        <a:defRPr sz="700" kern="1200">
-          <a:solidFill>
-            <a:schemeClr val="tx1"/>
-          </a:solidFill>
-          <a:latin typeface="+mn-lt"/>
-          <a:ea typeface="+mn-ea"/>
-          <a:cs typeface="+mn-cs"/>
-        </a:defRPr>
-      </a:lvl3pPr>
-      <a:lvl4pPr marL="457177" indent="-65311" algn="l" defTabSz="130622" rtl="0" eaLnBrk="1" latinLnBrk="0" hangingPunct="1">
-        <a:spcBef>
-          <a:spcPct val="20000"/>
-        </a:spcBef>
-        <a:buFont typeface="Arial"/>
-        <a:buChar char="–"/>
-        <a:defRPr sz="600" kern="1200">
-          <a:solidFill>
-            <a:schemeClr val="tx1"/>
-          </a:solidFill>
-          <a:latin typeface="+mn-lt"/>
-          <a:ea typeface="+mn-ea"/>
-          <a:cs typeface="+mn-cs"/>
-        </a:defRPr>
-      </a:lvl4pPr>
-      <a:lvl5pPr marL="587799" indent="-65311" algn="l" defTabSz="130622" rtl="0" eaLnBrk="1" latinLnBrk="0" hangingPunct="1">
-        <a:spcBef>
-          <a:spcPct val="20000"/>
-        </a:spcBef>
-        <a:buFont typeface="Arial"/>
-        <a:buChar char="»"/>
-        <a:defRPr sz="600" kern="1200">
-          <a:solidFill>
-            <a:schemeClr val="tx1"/>
-          </a:solidFill>
-          <a:latin typeface="+mn-lt"/>
-          <a:ea typeface="+mn-ea"/>
-          <a:cs typeface="+mn-cs"/>
-        </a:defRPr>
-      </a:lvl5pPr>
-      <a:lvl6pPr marL="718421" indent="-65311" algn="l" defTabSz="130622" rtl="0" eaLnBrk="1" latinLnBrk="0" hangingPunct="1">
+      <a:lvl3pPr marL="304952" indent="-60990" algn="l" defTabSz="121981" rtl="0" eaLnBrk="1" latinLnBrk="0" hangingPunct="1">
         <a:spcBef>
           <a:spcPct val="20000"/>
         </a:spcBef>
@@ -2937,14 +2892,59 @@
           <a:ea typeface="+mn-ea"/>
           <a:cs typeface="+mn-cs"/>
         </a:defRPr>
-      </a:lvl6pPr>
-      <a:lvl7pPr marL="849043" indent="-65311" algn="l" defTabSz="130622" rtl="0" eaLnBrk="1" latinLnBrk="0" hangingPunct="1">
+      </a:lvl3pPr>
+      <a:lvl4pPr marL="426933" indent="-60990" algn="l" defTabSz="121981" rtl="0" eaLnBrk="1" latinLnBrk="0" hangingPunct="1">
+        <a:spcBef>
+          <a:spcPct val="20000"/>
+        </a:spcBef>
+        <a:buFont typeface="Arial"/>
+        <a:buChar char="–"/>
+        <a:defRPr sz="500" kern="1200">
+          <a:solidFill>
+            <a:schemeClr val="tx1"/>
+          </a:solidFill>
+          <a:latin typeface="+mn-lt"/>
+          <a:ea typeface="+mn-ea"/>
+          <a:cs typeface="+mn-cs"/>
+        </a:defRPr>
+      </a:lvl4pPr>
+      <a:lvl5pPr marL="548914" indent="-60990" algn="l" defTabSz="121981" rtl="0" eaLnBrk="1" latinLnBrk="0" hangingPunct="1">
+        <a:spcBef>
+          <a:spcPct val="20000"/>
+        </a:spcBef>
+        <a:buFont typeface="Arial"/>
+        <a:buChar char="»"/>
+        <a:defRPr sz="500" kern="1200">
+          <a:solidFill>
+            <a:schemeClr val="tx1"/>
+          </a:solidFill>
+          <a:latin typeface="+mn-lt"/>
+          <a:ea typeface="+mn-ea"/>
+          <a:cs typeface="+mn-cs"/>
+        </a:defRPr>
+      </a:lvl5pPr>
+      <a:lvl6pPr marL="670895" indent="-60990" algn="l" defTabSz="121981" rtl="0" eaLnBrk="1" latinLnBrk="0" hangingPunct="1">
         <a:spcBef>
           <a:spcPct val="20000"/>
         </a:spcBef>
         <a:buFont typeface="Arial"/>
         <a:buChar char="•"/>
-        <a:defRPr sz="600" kern="1200">
+        <a:defRPr sz="500" kern="1200">
+          <a:solidFill>
+            <a:schemeClr val="tx1"/>
+          </a:solidFill>
+          <a:latin typeface="+mn-lt"/>
+          <a:ea typeface="+mn-ea"/>
+          <a:cs typeface="+mn-cs"/>
+        </a:defRPr>
+      </a:lvl6pPr>
+      <a:lvl7pPr marL="792876" indent="-60990" algn="l" defTabSz="121981" rtl="0" eaLnBrk="1" latinLnBrk="0" hangingPunct="1">
+        <a:spcBef>
+          <a:spcPct val="20000"/>
+        </a:spcBef>
+        <a:buFont typeface="Arial"/>
+        <a:buChar char="•"/>
+        <a:defRPr sz="500" kern="1200">
           <a:solidFill>
             <a:schemeClr val="tx1"/>
           </a:solidFill>
@@ -2953,13 +2953,13 @@
           <a:cs typeface="+mn-cs"/>
         </a:defRPr>
       </a:lvl7pPr>
-      <a:lvl8pPr marL="979665" indent="-65311" algn="l" defTabSz="130622" rtl="0" eaLnBrk="1" latinLnBrk="0" hangingPunct="1">
+      <a:lvl8pPr marL="914857" indent="-60990" algn="l" defTabSz="121981" rtl="0" eaLnBrk="1" latinLnBrk="0" hangingPunct="1">
         <a:spcBef>
           <a:spcPct val="20000"/>
         </a:spcBef>
         <a:buFont typeface="Arial"/>
         <a:buChar char="•"/>
-        <a:defRPr sz="600" kern="1200">
+        <a:defRPr sz="500" kern="1200">
           <a:solidFill>
             <a:schemeClr val="tx1"/>
           </a:solidFill>
@@ -2968,13 +2968,13 @@
           <a:cs typeface="+mn-cs"/>
         </a:defRPr>
       </a:lvl8pPr>
-      <a:lvl9pPr marL="1110287" indent="-65311" algn="l" defTabSz="130622" rtl="0" eaLnBrk="1" latinLnBrk="0" hangingPunct="1">
+      <a:lvl9pPr marL="1036838" indent="-60990" algn="l" defTabSz="121981" rtl="0" eaLnBrk="1" latinLnBrk="0" hangingPunct="1">
         <a:spcBef>
           <a:spcPct val="20000"/>
         </a:spcBef>
         <a:buFont typeface="Arial"/>
         <a:buChar char="•"/>
-        <a:defRPr sz="600" kern="1200">
+        <a:defRPr sz="500" kern="1200">
           <a:solidFill>
             <a:schemeClr val="tx1"/>
           </a:solidFill>
@@ -2988,7 +2988,7 @@
       <a:defPPr>
         <a:defRPr lang="en-US"/>
       </a:defPPr>
-      <a:lvl1pPr marL="0" algn="l" defTabSz="130622" rtl="0" eaLnBrk="1" latinLnBrk="0" hangingPunct="1">
+      <a:lvl1pPr marL="0" algn="l" defTabSz="121981" rtl="0" eaLnBrk="1" latinLnBrk="0" hangingPunct="1">
         <a:defRPr sz="500" kern="1200">
           <a:solidFill>
             <a:schemeClr val="tx1"/>
@@ -2998,7 +2998,7 @@
           <a:cs typeface="+mn-cs"/>
         </a:defRPr>
       </a:lvl1pPr>
-      <a:lvl2pPr marL="130622" algn="l" defTabSz="130622" rtl="0" eaLnBrk="1" latinLnBrk="0" hangingPunct="1">
+      <a:lvl2pPr marL="121981" algn="l" defTabSz="121981" rtl="0" eaLnBrk="1" latinLnBrk="0" hangingPunct="1">
         <a:defRPr sz="500" kern="1200">
           <a:solidFill>
             <a:schemeClr val="tx1"/>
@@ -3008,7 +3008,7 @@
           <a:cs typeface="+mn-cs"/>
         </a:defRPr>
       </a:lvl2pPr>
-      <a:lvl3pPr marL="261244" algn="l" defTabSz="130622" rtl="0" eaLnBrk="1" latinLnBrk="0" hangingPunct="1">
+      <a:lvl3pPr marL="243962" algn="l" defTabSz="121981" rtl="0" eaLnBrk="1" latinLnBrk="0" hangingPunct="1">
         <a:defRPr sz="500" kern="1200">
           <a:solidFill>
             <a:schemeClr val="tx1"/>
@@ -3018,7 +3018,7 @@
           <a:cs typeface="+mn-cs"/>
         </a:defRPr>
       </a:lvl3pPr>
-      <a:lvl4pPr marL="391866" algn="l" defTabSz="130622" rtl="0" eaLnBrk="1" latinLnBrk="0" hangingPunct="1">
+      <a:lvl4pPr marL="365943" algn="l" defTabSz="121981" rtl="0" eaLnBrk="1" latinLnBrk="0" hangingPunct="1">
         <a:defRPr sz="500" kern="1200">
           <a:solidFill>
             <a:schemeClr val="tx1"/>
@@ -3028,7 +3028,7 @@
           <a:cs typeface="+mn-cs"/>
         </a:defRPr>
       </a:lvl4pPr>
-      <a:lvl5pPr marL="522488" algn="l" defTabSz="130622" rtl="0" eaLnBrk="1" latinLnBrk="0" hangingPunct="1">
+      <a:lvl5pPr marL="487924" algn="l" defTabSz="121981" rtl="0" eaLnBrk="1" latinLnBrk="0" hangingPunct="1">
         <a:defRPr sz="500" kern="1200">
           <a:solidFill>
             <a:schemeClr val="tx1"/>
@@ -3038,7 +3038,7 @@
           <a:cs typeface="+mn-cs"/>
         </a:defRPr>
       </a:lvl5pPr>
-      <a:lvl6pPr marL="653110" algn="l" defTabSz="130622" rtl="0" eaLnBrk="1" latinLnBrk="0" hangingPunct="1">
+      <a:lvl6pPr marL="609905" algn="l" defTabSz="121981" rtl="0" eaLnBrk="1" latinLnBrk="0" hangingPunct="1">
         <a:defRPr sz="500" kern="1200">
           <a:solidFill>
             <a:schemeClr val="tx1"/>
@@ -3048,7 +3048,7 @@
           <a:cs typeface="+mn-cs"/>
         </a:defRPr>
       </a:lvl6pPr>
-      <a:lvl7pPr marL="783732" algn="l" defTabSz="130622" rtl="0" eaLnBrk="1" latinLnBrk="0" hangingPunct="1">
+      <a:lvl7pPr marL="731886" algn="l" defTabSz="121981" rtl="0" eaLnBrk="1" latinLnBrk="0" hangingPunct="1">
         <a:defRPr sz="500" kern="1200">
           <a:solidFill>
             <a:schemeClr val="tx1"/>
@@ -3058,7 +3058,7 @@
           <a:cs typeface="+mn-cs"/>
         </a:defRPr>
       </a:lvl7pPr>
-      <a:lvl8pPr marL="914354" algn="l" defTabSz="130622" rtl="0" eaLnBrk="1" latinLnBrk="0" hangingPunct="1">
+      <a:lvl8pPr marL="853867" algn="l" defTabSz="121981" rtl="0" eaLnBrk="1" latinLnBrk="0" hangingPunct="1">
         <a:defRPr sz="500" kern="1200">
           <a:solidFill>
             <a:schemeClr val="tx1"/>
@@ -3068,7 +3068,7 @@
           <a:cs typeface="+mn-cs"/>
         </a:defRPr>
       </a:lvl8pPr>
-      <a:lvl9pPr marL="1044976" algn="l" defTabSz="130622" rtl="0" eaLnBrk="1" latinLnBrk="0" hangingPunct="1">
+      <a:lvl9pPr marL="975848" algn="l" defTabSz="121981" rtl="0" eaLnBrk="1" latinLnBrk="0" hangingPunct="1">
         <a:defRPr sz="500" kern="1200">
           <a:solidFill>
             <a:schemeClr val="tx1"/>
@@ -3108,7 +3108,7 @@
         </p:nvSpPr>
         <p:spPr>
           <a:xfrm>
-            <a:off x="64147" y="76337"/>
+            <a:off x="22225" y="23091"/>
             <a:ext cx="586728" cy="294243"/>
           </a:xfrm>
           <a:prstGeom prst="rect">
@@ -3147,14 +3147,14 @@
       </p:sp>
       <p:cxnSp>
         <p:nvCxnSpPr>
-          <p:cNvPr id="7" name="Straight Arrow Connector 6"/>
+          <p:cNvPr id="5" name="Straight Arrow Connector 4"/>
           <p:cNvCxnSpPr/>
           <p:nvPr/>
         </p:nvCxnSpPr>
         <p:spPr>
           <a:xfrm flipV="1">
-            <a:off x="654696" y="220841"/>
-            <a:ext cx="1051560" cy="2720"/>
+            <a:off x="616296" y="161912"/>
+            <a:ext cx="1133856" cy="2720"/>
           </a:xfrm>
           <a:prstGeom prst="straightConnector1">
             <a:avLst/>
@@ -3184,13 +3184,13 @@
       </p:cxnSp>
       <p:sp>
         <p:nvSpPr>
-          <p:cNvPr id="8" name="TextBox 7"/>
+          <p:cNvPr id="6" name="TextBox 5"/>
           <p:cNvSpPr txBox="1"/>
           <p:nvPr/>
         </p:nvSpPr>
         <p:spPr>
           <a:xfrm>
-            <a:off x="13347" y="66952"/>
+            <a:off x="-28575" y="13706"/>
             <a:ext cx="683596" cy="307777"/>
           </a:xfrm>
           <a:prstGeom prst="rect">
@@ -3220,49 +3220,13 @@
       </p:sp>
       <p:sp>
         <p:nvSpPr>
-          <p:cNvPr id="9" name="TextBox 8"/>
+          <p:cNvPr id="7" name="TextBox 6"/>
           <p:cNvSpPr txBox="1"/>
           <p:nvPr/>
         </p:nvSpPr>
         <p:spPr>
           <a:xfrm>
-            <a:off x="13347" y="1444150"/>
-            <a:ext cx="1160263" cy="307777"/>
-          </a:xfrm>
-          <a:prstGeom prst="rect">
-            <a:avLst/>
-          </a:prstGeom>
-          <a:noFill/>
-        </p:spPr>
-        <p:txBody>
-          <a:bodyPr wrap="none" rtlCol="0">
-            <a:spAutoFit/>
-          </a:bodyPr>
-          <a:lstStyle/>
-          <a:p>
-            <a:r>
-              <a:rPr lang="en-US" sz="1400" dirty="0" smtClean="0">
-                <a:latin typeface="Optima"/>
-                <a:cs typeface="Optima"/>
-              </a:rPr>
-              <a:t>Environment</a:t>
-            </a:r>
-            <a:endParaRPr lang="en-US" sz="1400" dirty="0">
-              <a:latin typeface="Optima"/>
-              <a:cs typeface="Optima"/>
-            </a:endParaRPr>
-          </a:p>
-        </p:txBody>
-      </p:sp>
-      <p:sp>
-        <p:nvSpPr>
-          <p:cNvPr id="11" name="TextBox 10"/>
-          <p:cNvSpPr txBox="1"/>
-          <p:nvPr/>
-        </p:nvSpPr>
-        <p:spPr>
-          <a:xfrm>
-            <a:off x="13825" y="747872"/>
+            <a:off x="707063" y="584468"/>
             <a:ext cx="1348774" cy="307777"/>
           </a:xfrm>
           <a:prstGeom prst="rect">
@@ -3292,14 +3256,14 @@
       </p:sp>
       <p:sp>
         <p:nvSpPr>
-          <p:cNvPr id="14" name="Rectangle 13"/>
+          <p:cNvPr id="8" name="Rectangle 7"/>
           <p:cNvSpPr/>
           <p:nvPr/>
         </p:nvSpPr>
         <p:spPr>
           <a:xfrm>
-            <a:off x="64147" y="1457684"/>
-            <a:ext cx="1050278" cy="294243"/>
+            <a:off x="743963" y="584468"/>
+            <a:ext cx="1250562" cy="294243"/>
           </a:xfrm>
           <a:prstGeom prst="rect">
             <a:avLst/>
@@ -3337,14 +3301,95 @@
       </p:sp>
       <p:sp>
         <p:nvSpPr>
-          <p:cNvPr id="15" name="Rectangle 14"/>
+          <p:cNvPr id="9" name="TextBox 8"/>
+          <p:cNvSpPr txBox="1"/>
+          <p:nvPr/>
+        </p:nvSpPr>
+        <p:spPr>
+          <a:xfrm>
+            <a:off x="716574" y="-10995"/>
+            <a:ext cx="828943" cy="338554"/>
+          </a:xfrm>
+          <a:prstGeom prst="rect">
+            <a:avLst/>
+          </a:prstGeom>
+          <a:noFill/>
+        </p:spPr>
+        <p:txBody>
+          <a:bodyPr wrap="none" rtlCol="0">
+            <a:spAutoFit/>
+          </a:bodyPr>
+          <a:lstStyle/>
+          <a:p>
+            <a:r>
+              <a:rPr lang="en-US" sz="800" dirty="0" smtClean="0">
+                <a:latin typeface="Optima"/>
+                <a:cs typeface="Optima"/>
+              </a:rPr>
+              <a:t>Bellman</a:t>
+            </a:r>
+          </a:p>
+          <a:p>
+            <a:r>
+              <a:rPr lang="en-US" sz="800" dirty="0" smtClean="0">
+                <a:latin typeface="Optima"/>
+                <a:cs typeface="Optima"/>
+              </a:rPr>
+              <a:t>approximation</a:t>
+            </a:r>
+            <a:endParaRPr lang="en-US" sz="800" dirty="0">
+              <a:latin typeface="Optima"/>
+              <a:cs typeface="Optima"/>
+            </a:endParaRPr>
+          </a:p>
+        </p:txBody>
+      </p:sp>
+      <p:sp>
+        <p:nvSpPr>
+          <p:cNvPr id="10" name="TextBox 9"/>
+          <p:cNvSpPr txBox="1"/>
+          <p:nvPr/>
+        </p:nvSpPr>
+        <p:spPr>
+          <a:xfrm>
+            <a:off x="1700650" y="1006"/>
+            <a:ext cx="1088271" cy="307777"/>
+          </a:xfrm>
+          <a:prstGeom prst="rect">
+            <a:avLst/>
+          </a:prstGeom>
+          <a:noFill/>
+        </p:spPr>
+        <p:txBody>
+          <a:bodyPr wrap="none" rtlCol="0">
+            <a:spAutoFit/>
+          </a:bodyPr>
+          <a:lstStyle/>
+          <a:p>
+            <a:r>
+              <a:rPr lang="en-US" sz="1400" dirty="0" smtClean="0">
+                <a:latin typeface="Optima"/>
+                <a:cs typeface="Optima"/>
+              </a:rPr>
+              <a:t>State values</a:t>
+            </a:r>
+            <a:endParaRPr lang="en-US" sz="1400" dirty="0">
+              <a:latin typeface="Optima"/>
+              <a:cs typeface="Optima"/>
+            </a:endParaRPr>
+          </a:p>
+        </p:txBody>
+      </p:sp>
+      <p:sp>
+        <p:nvSpPr>
+          <p:cNvPr id="11" name="Rectangle 10"/>
           <p:cNvSpPr/>
           <p:nvPr/>
         </p:nvSpPr>
         <p:spPr>
           <a:xfrm>
-            <a:off x="64024" y="747872"/>
-            <a:ext cx="1246787" cy="294243"/>
+            <a:off x="1753160" y="21307"/>
+            <a:ext cx="970627" cy="294243"/>
           </a:xfrm>
           <a:prstGeom prst="rect">
             <a:avLst/>
@@ -3382,14 +3427,14 @@
       </p:sp>
       <p:sp>
         <p:nvSpPr>
-          <p:cNvPr id="20" name="TextBox 19"/>
+          <p:cNvPr id="12" name="TextBox 11"/>
           <p:cNvSpPr txBox="1"/>
           <p:nvPr/>
         </p:nvSpPr>
         <p:spPr>
-          <a:xfrm>
-            <a:off x="1911009" y="1045629"/>
-            <a:ext cx="851241" cy="738664"/>
+          <a:xfrm rot="18900000">
+            <a:off x="1945874" y="322930"/>
+            <a:ext cx="549482" cy="377026"/>
           </a:xfrm>
           <a:prstGeom prst="rect">
             <a:avLst/>
@@ -3397,7 +3442,101 @@
           <a:noFill/>
         </p:spPr>
         <p:txBody>
-          <a:bodyPr wrap="square" rtlCol="0">
+          <a:bodyPr wrap="none" rtlCol="0">
+            <a:spAutoFit/>
+          </a:bodyPr>
+          <a:lstStyle/>
+          <a:p>
+            <a:pPr>
+              <a:spcBef>
+                <a:spcPts val="250"/>
+              </a:spcBef>
+            </a:pPr>
+            <a:r>
+              <a:rPr lang="en-US" sz="800" dirty="0" smtClean="0">
+                <a:latin typeface="Optima"/>
+                <a:cs typeface="Optima"/>
+              </a:rPr>
+              <a:t>Shaping</a:t>
+            </a:r>
+          </a:p>
+          <a:p>
+            <a:pPr>
+              <a:spcBef>
+                <a:spcPts val="250"/>
+              </a:spcBef>
+            </a:pPr>
+            <a:r>
+              <a:rPr lang="en-US" sz="800" dirty="0" smtClean="0">
+                <a:latin typeface="Optima"/>
+                <a:cs typeface="Optima"/>
+              </a:rPr>
+              <a:t>theorem</a:t>
+            </a:r>
+            <a:endParaRPr lang="en-US" sz="800" dirty="0">
+              <a:latin typeface="Optima"/>
+              <a:cs typeface="Optima"/>
+            </a:endParaRPr>
+          </a:p>
+        </p:txBody>
+      </p:sp>
+      <p:cxnSp>
+        <p:nvCxnSpPr>
+          <p:cNvPr id="13" name="Straight Arrow Connector 12"/>
+          <p:cNvCxnSpPr>
+            <a:stCxn id="12" idx="3"/>
+          </p:cNvCxnSpPr>
+          <p:nvPr/>
+        </p:nvCxnSpPr>
+        <p:spPr>
+          <a:xfrm flipH="1">
+            <a:off x="1997902" y="317172"/>
+            <a:ext cx="416984" cy="420618"/>
+          </a:xfrm>
+          <a:prstGeom prst="straightConnector1">
+            <a:avLst/>
+          </a:prstGeom>
+          <a:ln w="12700">
+            <a:solidFill>
+              <a:schemeClr val="tx1"/>
+            </a:solidFill>
+            <a:tailEnd type="triangle" w="med" len="lg"/>
+          </a:ln>
+          <a:effectLst/>
+        </p:spPr>
+        <p:style>
+          <a:lnRef idx="2">
+            <a:schemeClr val="accent1"/>
+          </a:lnRef>
+          <a:fillRef idx="0">
+            <a:schemeClr val="accent1"/>
+          </a:fillRef>
+          <a:effectRef idx="1">
+            <a:schemeClr val="accent1"/>
+          </a:effectRef>
+          <a:fontRef idx="minor">
+            <a:schemeClr val="tx1"/>
+          </a:fontRef>
+        </p:style>
+      </p:cxnSp>
+      <p:sp>
+        <p:nvSpPr>
+          <p:cNvPr id="14" name="TextBox 13"/>
+          <p:cNvSpPr txBox="1"/>
+          <p:nvPr/>
+        </p:nvSpPr>
+        <p:spPr>
+          <a:xfrm>
+            <a:off x="-29217" y="1198349"/>
+            <a:ext cx="1160263" cy="307777"/>
+          </a:xfrm>
+          <a:prstGeom prst="rect">
+            <a:avLst/>
+          </a:prstGeom>
+          <a:noFill/>
+        </p:spPr>
+        <p:txBody>
+          <a:bodyPr wrap="none" rtlCol="0">
             <a:spAutoFit/>
           </a:bodyPr>
           <a:lstStyle/>
@@ -3407,16 +3546,7 @@
                 <a:latin typeface="Optima"/>
                 <a:cs typeface="Optima"/>
               </a:rPr>
-              <a:t>Policy/</a:t>
-            </a:r>
-          </a:p>
-          <a:p>
-            <a:r>
-              <a:rPr lang="en-US" sz="1400" dirty="0" smtClean="0">
-                <a:latin typeface="Optima"/>
-                <a:cs typeface="Optima"/>
-              </a:rPr>
-              <a:t>reward function</a:t>
+              <a:t>Environment</a:t>
             </a:r>
             <a:endParaRPr lang="en-US" sz="1400" dirty="0">
               <a:latin typeface="Optima"/>
@@ -3427,14 +3557,14 @@
       </p:sp>
       <p:sp>
         <p:nvSpPr>
-          <p:cNvPr id="21" name="Rectangle 20"/>
+          <p:cNvPr id="15" name="Rectangle 14"/>
           <p:cNvSpPr/>
           <p:nvPr/>
         </p:nvSpPr>
         <p:spPr>
           <a:xfrm>
-            <a:off x="1955800" y="1045629"/>
-            <a:ext cx="722912" cy="705625"/>
+            <a:off x="21582" y="1211883"/>
+            <a:ext cx="1050278" cy="294243"/>
           </a:xfrm>
           <a:prstGeom prst="rect">
             <a:avLst/>
@@ -3470,15 +3600,105 @@
           </a:p>
         </p:txBody>
       </p:sp>
+      <p:sp>
+        <p:nvSpPr>
+          <p:cNvPr id="16" name="TextBox 15"/>
+          <p:cNvSpPr txBox="1"/>
+          <p:nvPr/>
+        </p:nvSpPr>
+        <p:spPr>
+          <a:xfrm>
+            <a:off x="1875298" y="995607"/>
+            <a:ext cx="975065" cy="523220"/>
+          </a:xfrm>
+          <a:prstGeom prst="rect">
+            <a:avLst/>
+          </a:prstGeom>
+          <a:noFill/>
+        </p:spPr>
+        <p:txBody>
+          <a:bodyPr wrap="square" rtlCol="0">
+            <a:spAutoFit/>
+          </a:bodyPr>
+          <a:lstStyle/>
+          <a:p>
+            <a:r>
+              <a:rPr lang="en-US" sz="1400" dirty="0" smtClean="0">
+                <a:latin typeface="Optima"/>
+                <a:cs typeface="Optima"/>
+              </a:rPr>
+              <a:t>Policy/</a:t>
+            </a:r>
+          </a:p>
+          <a:p>
+            <a:r>
+              <a:rPr lang="en-US" sz="1400" dirty="0" smtClean="0">
+                <a:latin typeface="Optima"/>
+                <a:cs typeface="Optima"/>
+              </a:rPr>
+              <a:t>Q-values</a:t>
+            </a:r>
+            <a:endParaRPr lang="en-US" sz="1400" dirty="0">
+              <a:latin typeface="Optima"/>
+              <a:cs typeface="Optima"/>
+            </a:endParaRPr>
+          </a:p>
+        </p:txBody>
+      </p:sp>
+      <p:sp>
+        <p:nvSpPr>
+          <p:cNvPr id="17" name="Rectangle 16"/>
+          <p:cNvSpPr/>
+          <p:nvPr/>
+        </p:nvSpPr>
+        <p:spPr>
+          <a:xfrm>
+            <a:off x="1912641" y="1017847"/>
+            <a:ext cx="809231" cy="487606"/>
+          </a:xfrm>
+          <a:prstGeom prst="rect">
+            <a:avLst/>
+          </a:prstGeom>
+          <a:noFill/>
+          <a:ln w="19050">
+            <a:solidFill>
+              <a:schemeClr val="tx1"/>
+            </a:solidFill>
+          </a:ln>
+          <a:effectLst/>
+        </p:spPr>
+        <p:style>
+          <a:lnRef idx="1">
+            <a:schemeClr val="accent1"/>
+          </a:lnRef>
+          <a:fillRef idx="3">
+            <a:schemeClr val="accent1"/>
+          </a:fillRef>
+          <a:effectRef idx="2">
+            <a:schemeClr val="accent1"/>
+          </a:effectRef>
+          <a:fontRef idx="minor">
+            <a:schemeClr val="lt1"/>
+          </a:fontRef>
+        </p:style>
+        <p:txBody>
+          <a:bodyPr rtlCol="0" anchor="ctr"/>
+          <a:lstStyle/>
+          <a:p>
+            <a:pPr algn="ctr"/>
+            <a:endParaRPr lang="en-US"/>
+          </a:p>
+        </p:txBody>
+      </p:sp>
       <p:cxnSp>
         <p:nvCxnSpPr>
-          <p:cNvPr id="22" name="Straight Arrow Connector 21"/>
+          <p:cNvPr id="18" name="Straight Arrow Connector 17"/>
           <p:cNvCxnSpPr/>
           <p:nvPr/>
         </p:nvCxnSpPr>
         <p:spPr>
           <a:xfrm flipV="1">
-            <a:off x="1118734" y="1547297"/>
+            <a:off x="1079345" y="1295144"/>
             <a:ext cx="832104" cy="2104"/>
           </a:xfrm>
           <a:prstGeom prst="straightConnector1">
@@ -3509,13 +3729,13 @@
       </p:cxnSp>
       <p:cxnSp>
         <p:nvCxnSpPr>
-          <p:cNvPr id="23" name="Straight Arrow Connector 22"/>
+          <p:cNvPr id="19" name="Straight Arrow Connector 18"/>
           <p:cNvCxnSpPr/>
           <p:nvPr/>
         </p:nvCxnSpPr>
         <p:spPr>
           <a:xfrm flipH="1" flipV="1">
-            <a:off x="1119926" y="1671122"/>
+            <a:off x="1077362" y="1418969"/>
             <a:ext cx="832104" cy="2104"/>
           </a:xfrm>
           <a:prstGeom prst="straightConnector1">
@@ -3546,14 +3766,14 @@
       </p:cxnSp>
       <p:sp>
         <p:nvSpPr>
-          <p:cNvPr id="27" name="TextBox 26"/>
+          <p:cNvPr id="20" name="TextBox 19"/>
           <p:cNvSpPr txBox="1"/>
           <p:nvPr/>
         </p:nvSpPr>
         <p:spPr>
           <a:xfrm>
-            <a:off x="642803" y="48389"/>
-            <a:ext cx="828943" cy="338554"/>
+            <a:off x="1064034" y="1127325"/>
+            <a:ext cx="792214" cy="215444"/>
           </a:xfrm>
           <a:prstGeom prst="rect">
             <a:avLst/>
@@ -3567,20 +3787,11 @@
           <a:lstStyle/>
           <a:p>
             <a:r>
-              <a:rPr lang="en-US" sz="800" dirty="0" smtClean="0">
+              <a:rPr lang="en-US" sz="800" dirty="0" err="1" smtClean="0">
                 <a:latin typeface="Optima"/>
                 <a:cs typeface="Optima"/>
               </a:rPr>
-              <a:t>Bellman</a:t>
-            </a:r>
-          </a:p>
-          <a:p>
-            <a:r>
-              <a:rPr lang="en-US" sz="800" dirty="0" smtClean="0">
-                <a:latin typeface="Optima"/>
-                <a:cs typeface="Optima"/>
-              </a:rPr>
-              <a:t>approximation</a:t>
+              <a:t>State+Reward</a:t>
             </a:r>
             <a:endParaRPr lang="en-US" sz="800" dirty="0">
               <a:latin typeface="Optima"/>
@@ -3591,49 +3802,13 @@
       </p:sp>
       <p:sp>
         <p:nvSpPr>
-          <p:cNvPr id="28" name="TextBox 27"/>
+          <p:cNvPr id="21" name="TextBox 20"/>
           <p:cNvSpPr txBox="1"/>
           <p:nvPr/>
         </p:nvSpPr>
         <p:spPr>
           <a:xfrm>
-            <a:off x="1312973" y="1379478"/>
-            <a:ext cx="395595" cy="215444"/>
-          </a:xfrm>
-          <a:prstGeom prst="rect">
-            <a:avLst/>
-          </a:prstGeom>
-          <a:noFill/>
-        </p:spPr>
-        <p:txBody>
-          <a:bodyPr wrap="none" rtlCol="0">
-            <a:spAutoFit/>
-          </a:bodyPr>
-          <a:lstStyle/>
-          <a:p>
-            <a:r>
-              <a:rPr lang="en-US" sz="800" dirty="0" smtClean="0">
-                <a:latin typeface="Optima"/>
-                <a:cs typeface="Optima"/>
-              </a:rPr>
-              <a:t>State</a:t>
-            </a:r>
-            <a:endParaRPr lang="en-US" sz="800" dirty="0">
-              <a:latin typeface="Optima"/>
-              <a:cs typeface="Optima"/>
-            </a:endParaRPr>
-          </a:p>
-        </p:txBody>
-      </p:sp>
-      <p:sp>
-        <p:nvSpPr>
-          <p:cNvPr id="29" name="TextBox 28"/>
-          <p:cNvSpPr txBox="1"/>
-          <p:nvPr/>
-        </p:nvSpPr>
-        <p:spPr>
-          <a:xfrm>
-            <a:off x="1299729" y="1620322"/>
+            <a:off x="1196839" y="1368169"/>
             <a:ext cx="475514" cy="215444"/>
           </a:xfrm>
           <a:prstGeom prst="rect">
@@ -3661,152 +3836,16 @@
           </a:p>
         </p:txBody>
       </p:sp>
-      <p:sp>
-        <p:nvSpPr>
-          <p:cNvPr id="30" name="TextBox 29"/>
-          <p:cNvSpPr txBox="1"/>
-          <p:nvPr/>
-        </p:nvSpPr>
-        <p:spPr>
-          <a:xfrm>
-            <a:off x="1658104" y="53418"/>
-            <a:ext cx="1088271" cy="307777"/>
-          </a:xfrm>
-          <a:prstGeom prst="rect">
-            <a:avLst/>
-          </a:prstGeom>
-          <a:noFill/>
-        </p:spPr>
-        <p:txBody>
-          <a:bodyPr wrap="none" rtlCol="0">
-            <a:spAutoFit/>
-          </a:bodyPr>
-          <a:lstStyle/>
-          <a:p>
-            <a:r>
-              <a:rPr lang="en-US" sz="1400" dirty="0" smtClean="0">
-                <a:latin typeface="Optima"/>
-                <a:cs typeface="Optima"/>
-              </a:rPr>
-              <a:t>State values</a:t>
-            </a:r>
-            <a:endParaRPr lang="en-US" sz="1400" dirty="0">
-              <a:latin typeface="Optima"/>
-              <a:cs typeface="Optima"/>
-            </a:endParaRPr>
-          </a:p>
-        </p:txBody>
-      </p:sp>
-      <p:sp>
-        <p:nvSpPr>
-          <p:cNvPr id="31" name="Rectangle 30"/>
-          <p:cNvSpPr/>
-          <p:nvPr/>
-        </p:nvSpPr>
-        <p:spPr>
-          <a:xfrm>
-            <a:off x="1710614" y="73719"/>
-            <a:ext cx="970627" cy="294243"/>
-          </a:xfrm>
-          <a:prstGeom prst="rect">
-            <a:avLst/>
-          </a:prstGeom>
-          <a:noFill/>
-          <a:ln w="19050">
-            <a:solidFill>
-              <a:schemeClr val="tx1"/>
-            </a:solidFill>
-          </a:ln>
-          <a:effectLst/>
-        </p:spPr>
-        <p:style>
-          <a:lnRef idx="1">
-            <a:schemeClr val="accent1"/>
-          </a:lnRef>
-          <a:fillRef idx="3">
-            <a:schemeClr val="accent1"/>
-          </a:fillRef>
-          <a:effectRef idx="2">
-            <a:schemeClr val="accent1"/>
-          </a:effectRef>
-          <a:fontRef idx="minor">
-            <a:schemeClr val="lt1"/>
-          </a:fontRef>
-        </p:style>
-        <p:txBody>
-          <a:bodyPr rtlCol="0" anchor="ctr"/>
-          <a:lstStyle/>
-          <a:p>
-            <a:pPr algn="ctr"/>
-            <a:endParaRPr lang="en-US"/>
-          </a:p>
-        </p:txBody>
-      </p:sp>
-      <p:sp>
-        <p:nvSpPr>
-          <p:cNvPr id="38" name="TextBox 37"/>
-          <p:cNvSpPr txBox="1"/>
-          <p:nvPr/>
-        </p:nvSpPr>
-        <p:spPr>
-          <a:xfrm rot="19939079">
-            <a:off x="1468752" y="431813"/>
-            <a:ext cx="549482" cy="377026"/>
-          </a:xfrm>
-          <a:prstGeom prst="rect">
-            <a:avLst/>
-          </a:prstGeom>
-          <a:noFill/>
-        </p:spPr>
-        <p:txBody>
-          <a:bodyPr wrap="none" rtlCol="0">
-            <a:spAutoFit/>
-          </a:bodyPr>
-          <a:lstStyle/>
-          <a:p>
-            <a:pPr>
-              <a:spcBef>
-                <a:spcPts val="250"/>
-              </a:spcBef>
-            </a:pPr>
-            <a:r>
-              <a:rPr lang="en-US" sz="800" dirty="0" smtClean="0">
-                <a:latin typeface="Optima"/>
-                <a:cs typeface="Optima"/>
-              </a:rPr>
-              <a:t>Shaping</a:t>
-            </a:r>
-          </a:p>
-          <a:p>
-            <a:pPr>
-              <a:spcBef>
-                <a:spcPts val="250"/>
-              </a:spcBef>
-            </a:pPr>
-            <a:r>
-              <a:rPr lang="en-US" sz="800" dirty="0" smtClean="0">
-                <a:latin typeface="Optima"/>
-                <a:cs typeface="Optima"/>
-              </a:rPr>
-              <a:t>theorem</a:t>
-            </a:r>
-            <a:endParaRPr lang="en-US" sz="800" dirty="0">
-              <a:latin typeface="Optima"/>
-              <a:cs typeface="Optima"/>
-            </a:endParaRPr>
-          </a:p>
-        </p:txBody>
-      </p:sp>
       <p:cxnSp>
         <p:nvCxnSpPr>
-          <p:cNvPr id="33" name="Straight Arrow Connector 32"/>
+          <p:cNvPr id="22" name="Straight Arrow Connector 21"/>
           <p:cNvCxnSpPr/>
           <p:nvPr/>
         </p:nvCxnSpPr>
         <p:spPr>
-          <a:xfrm rot="9120000" flipV="1">
-            <a:off x="1254816" y="608787"/>
-            <a:ext cx="1024128" cy="2104"/>
+          <a:xfrm>
+            <a:off x="1594693" y="881299"/>
+            <a:ext cx="1" cy="231873"/>
           </a:xfrm>
           <a:prstGeom prst="straightConnector1">
             <a:avLst/>
@@ -3834,25 +3873,24 @@
           </a:fontRef>
         </p:style>
       </p:cxnSp>
-      <p:cxnSp>
-        <p:nvCxnSpPr>
-          <p:cNvPr id="34" name="Straight Arrow Connector 33"/>
-          <p:cNvCxnSpPr/>
+      <p:sp>
+        <p:nvSpPr>
+          <p:cNvPr id="23" name="Left Brace 22"/>
+          <p:cNvSpPr/>
           <p:nvPr/>
-        </p:nvCxnSpPr>
-        <p:spPr>
-          <a:xfrm rot="1020000" flipV="1">
-            <a:off x="1288560" y="1047346"/>
-            <a:ext cx="676656" cy="2104"/>
-          </a:xfrm>
-          <a:prstGeom prst="straightConnector1">
+        </p:nvSpPr>
+        <p:spPr>
+          <a:xfrm rot="5400000">
+            <a:off x="1556156" y="978513"/>
+            <a:ext cx="76208" cy="342081"/>
+          </a:xfrm>
+          <a:prstGeom prst="leftBrace">
             <a:avLst/>
           </a:prstGeom>
           <a:ln w="12700">
             <a:solidFill>
               <a:schemeClr val="tx1"/>
             </a:solidFill>
-            <a:tailEnd type="triangle" w="med" len="lg"/>
           </a:ln>
           <a:effectLst/>
         </p:spPr>
@@ -3870,11 +3908,19 @@
             <a:schemeClr val="tx1"/>
           </a:fontRef>
         </p:style>
-      </p:cxnSp>
+        <p:txBody>
+          <a:bodyPr rtlCol="0" anchor="ctr"/>
+          <a:lstStyle/>
+          <a:p>
+            <a:pPr algn="ctr"/>
+            <a:endParaRPr lang="en-US"/>
+          </a:p>
+        </p:txBody>
+      </p:sp>
     </p:spTree>
     <p:extLst>
       <p:ext uri="{BB962C8B-B14F-4D97-AF65-F5344CB8AC3E}">
-        <p14:creationId xmlns:p14="http://schemas.microsoft.com/office/powerpoint/2010/main" val="1434107212"/>
+        <p14:creationId xmlns:p14="http://schemas.microsoft.com/office/powerpoint/2010/main" val="305250373"/>
       </p:ext>
     </p:extLst>
   </p:cSld>

</xml_diff>